<commit_message>
Added library and updated ppt
</commit_message>
<xml_diff>
--- a/project_02/docs/ENGI301_project_02.pptx
+++ b/project_02/docs/ENGI301_project_02.pptx
@@ -5,17 +5,16 @@
     <p:sldMasterId id="2147483648" r:id="rId1"/>
   </p:sldMasterIdLst>
   <p:notesMasterIdLst>
-    <p:notesMasterId r:id="rId7"/>
+    <p:notesMasterId r:id="rId6"/>
   </p:notesMasterIdLst>
   <p:handoutMasterIdLst>
-    <p:handoutMasterId r:id="rId8"/>
+    <p:handoutMasterId r:id="rId7"/>
   </p:handoutMasterIdLst>
   <p:sldIdLst>
     <p:sldId id="261" r:id="rId2"/>
-    <p:sldId id="650" r:id="rId3"/>
-    <p:sldId id="367" r:id="rId4"/>
-    <p:sldId id="592" r:id="rId5"/>
-    <p:sldId id="648" r:id="rId6"/>
+    <p:sldId id="367" r:id="rId3"/>
+    <p:sldId id="592" r:id="rId4"/>
+    <p:sldId id="648" r:id="rId5"/>
   </p:sldIdLst>
   <p:sldSz cx="12192000" cy="6858000"/>
   <p:notesSz cx="6858000" cy="9144000"/>
@@ -149,7 +148,7 @@
   <pc:docChgLst>
     <pc:chgData name="Sophianne Loh" userId="8637b7878f47fa27" providerId="LiveId" clId="{253E96B1-2C3E-416C-9E95-B50C92096C5C}"/>
     <pc:docChg chg="undo custSel delSld modSld">
-      <pc:chgData name="Sophianne Loh" userId="8637b7878f47fa27" providerId="LiveId" clId="{253E96B1-2C3E-416C-9E95-B50C92096C5C}" dt="2025-05-03T19:48:17.822" v="318" actId="2696"/>
+      <pc:chgData name="Sophianne Loh" userId="8637b7878f47fa27" providerId="LiveId" clId="{253E96B1-2C3E-416C-9E95-B50C92096C5C}" dt="2025-05-03T20:33:31.778" v="319" actId="2696"/>
       <pc:docMkLst>
         <pc:docMk/>
       </pc:docMkLst>
@@ -956,6 +955,13 @@
             <ac:cxnSpMk id="68" creationId="{A875D76E-B3DD-41FC-99E2-B01894E7D87F}"/>
           </ac:cxnSpMkLst>
         </pc:cxnChg>
+      </pc:sldChg>
+      <pc:sldChg chg="del">
+        <pc:chgData name="Sophianne Loh" userId="8637b7878f47fa27" providerId="LiveId" clId="{253E96B1-2C3E-416C-9E95-B50C92096C5C}" dt="2025-05-03T20:33:31.778" v="319" actId="2696"/>
+        <pc:sldMkLst>
+          <pc:docMk/>
+          <pc:sldMk cId="2452378278" sldId="650"/>
+        </pc:sldMkLst>
       </pc:sldChg>
     </pc:docChg>
   </pc:docChgLst>
@@ -15999,212 +16005,6 @@
           <p:cNvPr id="2" name="Title 1">
             <a:extLst>
               <a:ext uri="{FF2B5EF4-FFF2-40B4-BE49-F238E27FC236}">
-                <a16:creationId xmlns:a16="http://schemas.microsoft.com/office/drawing/2014/main" id="{F3E581E7-53E9-00F3-DD47-94391B885349}"/>
-              </a:ext>
-            </a:extLst>
-          </p:cNvPr>
-          <p:cNvSpPr>
-            <a:spLocks noGrp="1"/>
-          </p:cNvSpPr>
-          <p:nvPr>
-            <p:ph type="title"/>
-          </p:nvPr>
-        </p:nvSpPr>
-        <p:spPr/>
-        <p:txBody>
-          <a:bodyPr/>
-          <a:lstStyle/>
-          <a:p>
-            <a:r>
-              <a:rPr lang="en-US" dirty="0"/>
-              <a:t>Project Options</a:t>
-            </a:r>
-          </a:p>
-        </p:txBody>
-      </p:sp>
-      <p:sp>
-        <p:nvSpPr>
-          <p:cNvPr id="3" name="Content Placeholder 2">
-            <a:extLst>
-              <a:ext uri="{FF2B5EF4-FFF2-40B4-BE49-F238E27FC236}">
-                <a16:creationId xmlns:a16="http://schemas.microsoft.com/office/drawing/2014/main" id="{F569CDA4-A78B-2EEF-4173-30B96B9886F1}"/>
-              </a:ext>
-            </a:extLst>
-          </p:cNvPr>
-          <p:cNvSpPr>
-            <a:spLocks noGrp="1"/>
-          </p:cNvSpPr>
-          <p:nvPr>
-            <p:ph idx="1"/>
-          </p:nvPr>
-        </p:nvSpPr>
-        <p:spPr/>
-        <p:txBody>
-          <a:bodyPr/>
-          <a:lstStyle/>
-          <a:p>
-            <a:r>
-              <a:rPr lang="en-US" dirty="0"/>
-              <a:t>Can choose one of two options:</a:t>
-            </a:r>
-          </a:p>
-          <a:p>
-            <a:pPr marL="617220" lvl="1" indent="-342900">
-              <a:buFont typeface="+mj-lt"/>
-              <a:buAutoNum type="arabicPeriod"/>
-            </a:pPr>
-            <a:r>
-              <a:rPr lang="en-US" dirty="0"/>
-              <a:t>Create a PCB based on your Project #1</a:t>
-            </a:r>
-          </a:p>
-          <a:p>
-            <a:pPr marL="617220" lvl="1" indent="-342900">
-              <a:buFont typeface="+mj-lt"/>
-              <a:buAutoNum type="arabicPeriod"/>
-            </a:pPr>
-            <a:r>
-              <a:rPr lang="en-US" dirty="0"/>
-              <a:t>Create a PCB based on an example project</a:t>
-            </a:r>
-          </a:p>
-          <a:p>
-            <a:pPr lvl="1"/>
-            <a:endParaRPr lang="en-US" dirty="0"/>
-          </a:p>
-          <a:p>
-            <a:r>
-              <a:rPr lang="en-US" dirty="0"/>
-              <a:t>See Project #2 assignment for specific details</a:t>
-            </a:r>
-          </a:p>
-          <a:p>
-            <a:pPr lvl="1"/>
-            <a:r>
-              <a:rPr lang="en-US" dirty="0"/>
-              <a:t>If choosing Option 1</a:t>
-            </a:r>
-          </a:p>
-          <a:p>
-            <a:pPr lvl="2"/>
-            <a:r>
-              <a:rPr lang="en-US" dirty="0"/>
-              <a:t>Replace Background Information and System Block Diagram slides with your slides from the Project #1 proposal</a:t>
-            </a:r>
-          </a:p>
-          <a:p>
-            <a:pPr lvl="2"/>
-            <a:r>
-              <a:rPr lang="en-US" dirty="0"/>
-              <a:t>Create a Mechanical Drawing </a:t>
-            </a:r>
-          </a:p>
-          <a:p>
-            <a:pPr lvl="1"/>
-            <a:r>
-              <a:rPr lang="en-US" dirty="0"/>
-              <a:t>If choosing Option 2</a:t>
-            </a:r>
-          </a:p>
-          <a:p>
-            <a:pPr lvl="2"/>
-            <a:r>
-              <a:rPr lang="en-US" dirty="0"/>
-              <a:t>Used provided Background Information and System Block Diagram slides</a:t>
-            </a:r>
-          </a:p>
-          <a:p>
-            <a:pPr lvl="2"/>
-            <a:r>
-              <a:rPr lang="en-US" dirty="0"/>
-              <a:t>Create a Mechanical Drawing</a:t>
-            </a:r>
-          </a:p>
-        </p:txBody>
-      </p:sp>
-      <p:sp>
-        <p:nvSpPr>
-          <p:cNvPr id="4" name="TextBox 3">
-            <a:extLst>
-              <a:ext uri="{FF2B5EF4-FFF2-40B4-BE49-F238E27FC236}">
-                <a16:creationId xmlns:a16="http://schemas.microsoft.com/office/drawing/2014/main" id="{95964082-65D9-47E6-2FC9-D883EFCC4193}"/>
-              </a:ext>
-            </a:extLst>
-          </p:cNvPr>
-          <p:cNvSpPr txBox="1"/>
-          <p:nvPr/>
-        </p:nvSpPr>
-        <p:spPr>
-          <a:xfrm>
-            <a:off x="2880719" y="6286500"/>
-            <a:ext cx="6635151" cy="523220"/>
-          </a:xfrm>
-          <a:prstGeom prst="rect">
-            <a:avLst/>
-          </a:prstGeom>
-          <a:noFill/>
-        </p:spPr>
-        <p:txBody>
-          <a:bodyPr wrap="none" rtlCol="0">
-            <a:spAutoFit/>
-          </a:bodyPr>
-          <a:lstStyle/>
-          <a:p>
-            <a:pPr algn="ctr"/>
-            <a:r>
-              <a:rPr lang="en-US" sz="2800" b="1" dirty="0"/>
-              <a:t>Remove this slide in your submission</a:t>
-            </a:r>
-          </a:p>
-        </p:txBody>
-      </p:sp>
-    </p:spTree>
-    <p:extLst>
-      <p:ext uri="{BB962C8B-B14F-4D97-AF65-F5344CB8AC3E}">
-        <p14:creationId xmlns:p14="http://schemas.microsoft.com/office/powerpoint/2010/main" val="2452378278"/>
-      </p:ext>
-    </p:extLst>
-  </p:cSld>
-  <p:clrMapOvr>
-    <a:masterClrMapping/>
-  </p:clrMapOvr>
-  <mc:AlternateContent xmlns:mc="http://schemas.openxmlformats.org/markup-compatibility/2006" xmlns:p14="http://schemas.microsoft.com/office/powerpoint/2010/main">
-    <mc:Choice Requires="p14">
-      <p:transition spd="med" p14:dur="700">
-        <p:fade/>
-      </p:transition>
-    </mc:Choice>
-    <mc:Fallback xmlns="">
-      <p:transition spd="med">
-        <p:fade/>
-      </p:transition>
-    </mc:Fallback>
-  </mc:AlternateContent>
-</p:sld>
-</file>
-
-<file path=ppt/slides/slide3.xml><?xml version="1.0" encoding="utf-8"?>
-<p:sld xmlns:a="http://schemas.openxmlformats.org/drawingml/2006/main" xmlns:r="http://schemas.openxmlformats.org/officeDocument/2006/relationships" xmlns:p="http://schemas.openxmlformats.org/presentationml/2006/main">
-  <p:cSld>
-    <p:spTree>
-      <p:nvGrpSpPr>
-        <p:cNvPr id="1" name=""/>
-        <p:cNvGrpSpPr/>
-        <p:nvPr/>
-      </p:nvGrpSpPr>
-      <p:grpSpPr>
-        <a:xfrm>
-          <a:off x="0" y="0"/>
-          <a:ext cx="0" cy="0"/>
-          <a:chOff x="0" y="0"/>
-          <a:chExt cx="0" cy="0"/>
-        </a:xfrm>
-      </p:grpSpPr>
-      <p:sp>
-        <p:nvSpPr>
-          <p:cNvPr id="2" name="Title 1">
-            <a:extLst>
-              <a:ext uri="{FF2B5EF4-FFF2-40B4-BE49-F238E27FC236}">
                 <a16:creationId xmlns:a16="http://schemas.microsoft.com/office/drawing/2014/main" id="{E7939A49-57C9-4BE3-8B38-E944EB81906A}"/>
               </a:ext>
             </a:extLst>
@@ -16419,7 +16219,7 @@
 </p:sld>
 </file>
 
-<file path=ppt/slides/slide4.xml><?xml version="1.0" encoding="utf-8"?>
+<file path=ppt/slides/slide3.xml><?xml version="1.0" encoding="utf-8"?>
 <p:sld xmlns:a="http://schemas.openxmlformats.org/drawingml/2006/main" xmlns:r="http://schemas.openxmlformats.org/officeDocument/2006/relationships" xmlns:p="http://schemas.openxmlformats.org/presentationml/2006/main">
   <p:cSld>
     <p:spTree>
@@ -22893,7 +22693,7 @@
 </p:sld>
 </file>
 
-<file path=ppt/slides/slide5.xml><?xml version="1.0" encoding="utf-8"?>
+<file path=ppt/slides/slide4.xml><?xml version="1.0" encoding="utf-8"?>
 <p:sld xmlns:a="http://schemas.openxmlformats.org/drawingml/2006/main" xmlns:r="http://schemas.openxmlformats.org/officeDocument/2006/relationships" xmlns:p="http://schemas.openxmlformats.org/presentationml/2006/main">
   <p:cSld>
     <p:spTree>

</xml_diff>

<commit_message>
Upload all project_02 files
</commit_message>
<xml_diff>
--- a/project_02/docs/ENGI301_project_02.pptx
+++ b/project_02/docs/ENGI301_project_02.pptx
@@ -138,7 +138,7 @@
 <file path=ppt/revisionInfo.xml><?xml version="1.0" encoding="utf-8"?>
 <p1510:revInfo xmlns:a="http://schemas.openxmlformats.org/drawingml/2006/main" xmlns:r="http://schemas.openxmlformats.org/officeDocument/2006/relationships" xmlns:p1510="http://schemas.microsoft.com/office/powerpoint/2015/10/main">
   <p1510:revLst>
-    <p1510:client id="{253E96B1-2C3E-416C-9E95-B50C92096C5C}" v="38" dt="2025-05-03T19:45:15.744"/>
+    <p1510:client id="{253E96B1-2C3E-416C-9E95-B50C92096C5C}" v="51" dt="2025-05-04T20:59:58.441"/>
   </p1510:revLst>
 </p1510:revInfo>
 </file>
@@ -148,7 +148,7 @@
   <pc:docChgLst>
     <pc:chgData name="Sophianne Loh" userId="8637b7878f47fa27" providerId="LiveId" clId="{253E96B1-2C3E-416C-9E95-B50C92096C5C}"/>
     <pc:docChg chg="undo custSel delSld modSld">
-      <pc:chgData name="Sophianne Loh" userId="8637b7878f47fa27" providerId="LiveId" clId="{253E96B1-2C3E-416C-9E95-B50C92096C5C}" dt="2025-05-03T20:33:31.778" v="319" actId="2696"/>
+      <pc:chgData name="Sophianne Loh" userId="8637b7878f47fa27" providerId="LiveId" clId="{253E96B1-2C3E-416C-9E95-B50C92096C5C}" dt="2025-05-05T02:17:45.152" v="397" actId="1076"/>
       <pc:docMkLst>
         <pc:docMk/>
       </pc:docMkLst>
@@ -175,13 +175,13 @@
         </pc:sldMkLst>
       </pc:sldChg>
       <pc:sldChg chg="addSp delSp modSp mod">
-        <pc:chgData name="Sophianne Loh" userId="8637b7878f47fa27" providerId="LiveId" clId="{253E96B1-2C3E-416C-9E95-B50C92096C5C}" dt="2025-05-03T19:47:46.994" v="317" actId="20577"/>
+        <pc:chgData name="Sophianne Loh" userId="8637b7878f47fa27" providerId="LiveId" clId="{253E96B1-2C3E-416C-9E95-B50C92096C5C}" dt="2025-05-05T02:17:45.152" v="397" actId="1076"/>
         <pc:sldMkLst>
           <pc:docMk/>
           <pc:sldMk cId="2035144677" sldId="648"/>
         </pc:sldMkLst>
         <pc:spChg chg="add mod">
-          <ac:chgData name="Sophianne Loh" userId="8637b7878f47fa27" providerId="LiveId" clId="{253E96B1-2C3E-416C-9E95-B50C92096C5C}" dt="2025-05-03T19:47:32.966" v="315" actId="1076"/>
+          <ac:chgData name="Sophianne Loh" userId="8637b7878f47fa27" providerId="LiveId" clId="{253E96B1-2C3E-416C-9E95-B50C92096C5C}" dt="2025-05-04T20:59:50.549" v="369" actId="571"/>
           <ac:spMkLst>
             <pc:docMk/>
             <pc:sldMk cId="2035144677" sldId="648"/>
@@ -196,20 +196,44 @@
             <ac:spMk id="12" creationId="{C2977845-DEAF-A0AE-6FEC-A92D8369E383}"/>
           </ac:spMkLst>
         </pc:spChg>
+        <pc:spChg chg="add mod">
+          <ac:chgData name="Sophianne Loh" userId="8637b7878f47fa27" providerId="LiveId" clId="{253E96B1-2C3E-416C-9E95-B50C92096C5C}" dt="2025-05-04T19:56:34.397" v="342" actId="164"/>
+          <ac:spMkLst>
+            <pc:docMk/>
+            <pc:sldMk cId="2035144677" sldId="648"/>
+            <ac:spMk id="14" creationId="{4D262E35-7F89-8372-25DE-7F17487D1903}"/>
+          </ac:spMkLst>
+        </pc:spChg>
+        <pc:spChg chg="add mod">
+          <ac:chgData name="Sophianne Loh" userId="8637b7878f47fa27" providerId="LiveId" clId="{253E96B1-2C3E-416C-9E95-B50C92096C5C}" dt="2025-05-04T19:56:34.397" v="342" actId="164"/>
+          <ac:spMkLst>
+            <pc:docMk/>
+            <pc:sldMk cId="2035144677" sldId="648"/>
+            <ac:spMk id="15" creationId="{0B4D0880-200B-F418-8544-46B54BFB6616}"/>
+          </ac:spMkLst>
+        </pc:spChg>
         <pc:spChg chg="mod topLvl">
-          <ac:chgData name="Sophianne Loh" userId="8637b7878f47fa27" providerId="LiveId" clId="{253E96B1-2C3E-416C-9E95-B50C92096C5C}" dt="2025-05-03T19:36:48.947" v="239" actId="478"/>
+          <ac:chgData name="Sophianne Loh" userId="8637b7878f47fa27" providerId="LiveId" clId="{253E96B1-2C3E-416C-9E95-B50C92096C5C}" dt="2025-05-04T20:33:12.748" v="365" actId="1076"/>
           <ac:spMkLst>
             <pc:docMk/>
             <pc:sldMk cId="2035144677" sldId="648"/>
             <ac:spMk id="18" creationId="{C4BFC34B-D68E-B747-5FA5-D2B758951294}"/>
           </ac:spMkLst>
         </pc:spChg>
-        <pc:spChg chg="del mod">
-          <ac:chgData name="Sophianne Loh" userId="8637b7878f47fa27" providerId="LiveId" clId="{253E96B1-2C3E-416C-9E95-B50C92096C5C}" dt="2025-05-03T19:35:49.518" v="213" actId="478"/>
+        <pc:spChg chg="mod">
+          <ac:chgData name="Sophianne Loh" userId="8637b7878f47fa27" providerId="LiveId" clId="{253E96B1-2C3E-416C-9E95-B50C92096C5C}" dt="2025-05-04T19:56:44.575" v="343"/>
           <ac:spMkLst>
             <pc:docMk/>
             <pc:sldMk cId="2035144677" sldId="648"/>
-            <ac:spMk id="19" creationId="{9A9DF9A1-DC0B-81BA-D4AC-5D3C7640279D}"/>
+            <ac:spMk id="19" creationId="{9B5C83D9-C8F3-12F5-1BC6-9BC141FA9988}"/>
+          </ac:spMkLst>
+        </pc:spChg>
+        <pc:spChg chg="mod">
+          <ac:chgData name="Sophianne Loh" userId="8637b7878f47fa27" providerId="LiveId" clId="{253E96B1-2C3E-416C-9E95-B50C92096C5C}" dt="2025-05-04T19:56:58.271" v="347" actId="1076"/>
+          <ac:spMkLst>
+            <pc:docMk/>
+            <pc:sldMk cId="2035144677" sldId="648"/>
+            <ac:spMk id="20" creationId="{360B01E3-49F4-EAA2-3110-C43168EEFFF5}"/>
           </ac:spMkLst>
         </pc:spChg>
         <pc:spChg chg="add mod">
@@ -221,6 +245,14 @@
           </ac:spMkLst>
         </pc:spChg>
         <pc:spChg chg="mod">
+          <ac:chgData name="Sophianne Loh" userId="8637b7878f47fa27" providerId="LiveId" clId="{253E96B1-2C3E-416C-9E95-B50C92096C5C}" dt="2025-05-04T19:57:00.469" v="348"/>
+          <ac:spMkLst>
+            <pc:docMk/>
+            <pc:sldMk cId="2035144677" sldId="648"/>
+            <ac:spMk id="23" creationId="{055A1C95-6A0E-09C3-DC41-A9F963B62E11}"/>
+          </ac:spMkLst>
+        </pc:spChg>
+        <pc:spChg chg="mod">
           <ac:chgData name="Sophianne Loh" userId="8637b7878f47fa27" providerId="LiveId" clId="{253E96B1-2C3E-416C-9E95-B50C92096C5C}" dt="2025-05-03T19:35:30.476" v="210" actId="1076"/>
           <ac:spMkLst>
             <pc:docMk/>
@@ -229,27 +261,43 @@
           </ac:spMkLst>
         </pc:spChg>
         <pc:spChg chg="add mod">
-          <ac:chgData name="Sophianne Loh" userId="8637b7878f47fa27" providerId="LiveId" clId="{253E96B1-2C3E-416C-9E95-B50C92096C5C}" dt="2025-05-03T19:47:32.966" v="315" actId="1076"/>
+          <ac:chgData name="Sophianne Loh" userId="8637b7878f47fa27" providerId="LiveId" clId="{253E96B1-2C3E-416C-9E95-B50C92096C5C}" dt="2025-05-04T20:59:50.549" v="369" actId="571"/>
           <ac:spMkLst>
             <pc:docMk/>
             <pc:sldMk cId="2035144677" sldId="648"/>
             <ac:spMk id="28" creationId="{52CCEDC9-9DC9-A102-B112-887C042FA9E3}"/>
           </ac:spMkLst>
         </pc:spChg>
-        <pc:spChg chg="del mod">
-          <ac:chgData name="Sophianne Loh" userId="8637b7878f47fa27" providerId="LiveId" clId="{253E96B1-2C3E-416C-9E95-B50C92096C5C}" dt="2025-05-03T19:36:17.244" v="229" actId="478"/>
+        <pc:spChg chg="mod">
+          <ac:chgData name="Sophianne Loh" userId="8637b7878f47fa27" providerId="LiveId" clId="{253E96B1-2C3E-416C-9E95-B50C92096C5C}" dt="2025-05-04T19:57:16.063" v="350" actId="1076"/>
           <ac:spMkLst>
             <pc:docMk/>
             <pc:sldMk cId="2035144677" sldId="648"/>
-            <ac:spMk id="31" creationId="{C05A5711-B219-7B14-7A86-A63725E8846F}"/>
+            <ac:spMk id="30" creationId="{91D06043-E665-1716-18D7-7E548CECBF1B}"/>
           </ac:spMkLst>
         </pc:spChg>
-        <pc:spChg chg="del mod">
-          <ac:chgData name="Sophianne Loh" userId="8637b7878f47fa27" providerId="LiveId" clId="{253E96B1-2C3E-416C-9E95-B50C92096C5C}" dt="2025-05-03T19:36:27.335" v="232" actId="478"/>
+        <pc:spChg chg="mod">
+          <ac:chgData name="Sophianne Loh" userId="8637b7878f47fa27" providerId="LiveId" clId="{253E96B1-2C3E-416C-9E95-B50C92096C5C}" dt="2025-05-04T19:57:17.365" v="351"/>
           <ac:spMkLst>
             <pc:docMk/>
             <pc:sldMk cId="2035144677" sldId="648"/>
-            <ac:spMk id="35" creationId="{652A2DED-CA2E-8ECB-F1C1-DD1C0E2C3AB7}"/>
+            <ac:spMk id="32" creationId="{1729F06A-D676-DEA4-39CD-124D8597A809}"/>
+          </ac:spMkLst>
+        </pc:spChg>
+        <pc:spChg chg="mod">
+          <ac:chgData name="Sophianne Loh" userId="8637b7878f47fa27" providerId="LiveId" clId="{253E96B1-2C3E-416C-9E95-B50C92096C5C}" dt="2025-05-04T19:57:25.627" v="353" actId="1076"/>
+          <ac:spMkLst>
+            <pc:docMk/>
+            <pc:sldMk cId="2035144677" sldId="648"/>
+            <ac:spMk id="33" creationId="{455C48F5-BCAF-F1B3-F1F1-D3210BDD9756}"/>
+          </ac:spMkLst>
+        </pc:spChg>
+        <pc:spChg chg="mod">
+          <ac:chgData name="Sophianne Loh" userId="8637b7878f47fa27" providerId="LiveId" clId="{253E96B1-2C3E-416C-9E95-B50C92096C5C}" dt="2025-05-04T19:57:28.629" v="354"/>
+          <ac:spMkLst>
+            <pc:docMk/>
+            <pc:sldMk cId="2035144677" sldId="648"/>
+            <ac:spMk id="35" creationId="{1AB0B3DD-5ED2-1838-652E-085134D3D0CB}"/>
           </ac:spMkLst>
         </pc:spChg>
         <pc:spChg chg="mod">
@@ -260,24 +308,24 @@
             <ac:spMk id="36" creationId="{9F471EFC-E8D5-48D9-82C4-2134548FBF50}"/>
           </ac:spMkLst>
         </pc:spChg>
-        <pc:spChg chg="del mod">
-          <ac:chgData name="Sophianne Loh" userId="8637b7878f47fa27" providerId="LiveId" clId="{253E96B1-2C3E-416C-9E95-B50C92096C5C}" dt="2025-05-03T19:36:27.335" v="232" actId="478"/>
+        <pc:spChg chg="mod">
+          <ac:chgData name="Sophianne Loh" userId="8637b7878f47fa27" providerId="LiveId" clId="{253E96B1-2C3E-416C-9E95-B50C92096C5C}" dt="2025-05-04T19:57:28.629" v="354"/>
           <ac:spMkLst>
             <pc:docMk/>
             <pc:sldMk cId="2035144677" sldId="648"/>
-            <ac:spMk id="38" creationId="{974427BD-D897-F826-F32C-E2E64268CD5D}"/>
+            <ac:spMk id="37" creationId="{5BC5E3E5-3A32-1F01-8A12-B865CD8AD3E4}"/>
           </ac:spMkLst>
         </pc:spChg>
-        <pc:spChg chg="del mod">
-          <ac:chgData name="Sophianne Loh" userId="8637b7878f47fa27" providerId="LiveId" clId="{253E96B1-2C3E-416C-9E95-B50C92096C5C}" dt="2025-05-03T19:36:27.335" v="232" actId="478"/>
+        <pc:spChg chg="mod">
+          <ac:chgData name="Sophianne Loh" userId="8637b7878f47fa27" providerId="LiveId" clId="{253E96B1-2C3E-416C-9E95-B50C92096C5C}" dt="2025-05-04T19:57:32.656" v="356"/>
           <ac:spMkLst>
             <pc:docMk/>
             <pc:sldMk cId="2035144677" sldId="648"/>
-            <ac:spMk id="39" creationId="{A83692E0-BB48-4AE2-AC7E-076CB5423657}"/>
+            <ac:spMk id="39" creationId="{D25FAF6D-4480-3F78-BA53-2BE12D06C27D}"/>
           </ac:spMkLst>
         </pc:spChg>
         <pc:spChg chg="add mod">
-          <ac:chgData name="Sophianne Loh" userId="8637b7878f47fa27" providerId="LiveId" clId="{253E96B1-2C3E-416C-9E95-B50C92096C5C}" dt="2025-04-29T20:40:56.073" v="153" actId="164"/>
+          <ac:chgData name="Sophianne Loh" userId="8637b7878f47fa27" providerId="LiveId" clId="{253E96B1-2C3E-416C-9E95-B50C92096C5C}" dt="2025-05-04T20:59:50.549" v="369" actId="571"/>
           <ac:spMkLst>
             <pc:docMk/>
             <pc:sldMk cId="2035144677" sldId="648"/>
@@ -285,7 +333,7 @@
           </ac:spMkLst>
         </pc:spChg>
         <pc:spChg chg="add mod">
-          <ac:chgData name="Sophianne Loh" userId="8637b7878f47fa27" providerId="LiveId" clId="{253E96B1-2C3E-416C-9E95-B50C92096C5C}" dt="2025-04-29T20:40:56.073" v="153" actId="164"/>
+          <ac:chgData name="Sophianne Loh" userId="8637b7878f47fa27" providerId="LiveId" clId="{253E96B1-2C3E-416C-9E95-B50C92096C5C}" dt="2025-05-04T20:59:50.549" v="369" actId="571"/>
           <ac:spMkLst>
             <pc:docMk/>
             <pc:sldMk cId="2035144677" sldId="648"/>
@@ -293,19 +341,19 @@
           </ac:spMkLst>
         </pc:spChg>
         <pc:spChg chg="add del mod">
-          <ac:chgData name="Sophianne Loh" userId="8637b7878f47fa27" providerId="LiveId" clId="{253E96B1-2C3E-416C-9E95-B50C92096C5C}" dt="2025-04-29T20:40:56.073" v="153" actId="164"/>
+          <ac:chgData name="Sophianne Loh" userId="8637b7878f47fa27" providerId="LiveId" clId="{253E96B1-2C3E-416C-9E95-B50C92096C5C}" dt="2025-05-04T20:59:50.549" v="369" actId="571"/>
           <ac:spMkLst>
             <pc:docMk/>
             <pc:sldMk cId="2035144677" sldId="648"/>
             <ac:spMk id="42" creationId="{FB0E7A56-E6CD-37B1-1E66-0B81144C1273}"/>
           </ac:spMkLst>
         </pc:spChg>
-        <pc:spChg chg="del mod">
-          <ac:chgData name="Sophianne Loh" userId="8637b7878f47fa27" providerId="LiveId" clId="{253E96B1-2C3E-416C-9E95-B50C92096C5C}" dt="2025-05-03T19:36:27.335" v="232" actId="478"/>
+        <pc:spChg chg="mod">
+          <ac:chgData name="Sophianne Loh" userId="8637b7878f47fa27" providerId="LiveId" clId="{253E96B1-2C3E-416C-9E95-B50C92096C5C}" dt="2025-05-04T19:57:40.399" v="358" actId="1076"/>
           <ac:spMkLst>
             <pc:docMk/>
             <pc:sldMk cId="2035144677" sldId="648"/>
-            <ac:spMk id="43" creationId="{BA0E8F2C-2CCC-33CB-5066-64F78C0CCF3A}"/>
+            <ac:spMk id="43" creationId="{A31D1CE0-DF7D-9E95-709E-C8BA32093EAB}"/>
           </ac:spMkLst>
         </pc:spChg>
         <pc:spChg chg="add mod">
@@ -316,24 +364,16 @@
             <ac:spMk id="44" creationId="{600A82C3-7B29-5A41-6A3F-FDDD0D05389A}"/>
           </ac:spMkLst>
         </pc:spChg>
-        <pc:spChg chg="del mod">
-          <ac:chgData name="Sophianne Loh" userId="8637b7878f47fa27" providerId="LiveId" clId="{253E96B1-2C3E-416C-9E95-B50C92096C5C}" dt="2025-05-03T19:36:27.335" v="232" actId="478"/>
+        <pc:spChg chg="mod">
+          <ac:chgData name="Sophianne Loh" userId="8637b7878f47fa27" providerId="LiveId" clId="{253E96B1-2C3E-416C-9E95-B50C92096C5C}" dt="2025-05-04T19:57:41.158" v="359"/>
           <ac:spMkLst>
             <pc:docMk/>
             <pc:sldMk cId="2035144677" sldId="648"/>
-            <ac:spMk id="45" creationId="{6313F767-605A-40C3-0E78-6337D598F553}"/>
-          </ac:spMkLst>
-        </pc:spChg>
-        <pc:spChg chg="del mod">
-          <ac:chgData name="Sophianne Loh" userId="8637b7878f47fa27" providerId="LiveId" clId="{253E96B1-2C3E-416C-9E95-B50C92096C5C}" dt="2025-05-03T19:36:09.611" v="224" actId="478"/>
-          <ac:spMkLst>
-            <pc:docMk/>
-            <pc:sldMk cId="2035144677" sldId="648"/>
-            <ac:spMk id="46" creationId="{FE7183D0-BEF4-4034-655C-F6ABB939E06B}"/>
+            <ac:spMk id="46" creationId="{7AA38144-9B6C-2E9B-6EDE-706965880317}"/>
           </ac:spMkLst>
         </pc:spChg>
         <pc:spChg chg="add mod">
-          <ac:chgData name="Sophianne Loh" userId="8637b7878f47fa27" providerId="LiveId" clId="{253E96B1-2C3E-416C-9E95-B50C92096C5C}" dt="2025-04-29T20:41:34.629" v="162" actId="255"/>
+          <ac:chgData name="Sophianne Loh" userId="8637b7878f47fa27" providerId="LiveId" clId="{253E96B1-2C3E-416C-9E95-B50C92096C5C}" dt="2025-05-04T20:59:50.549" v="369" actId="571"/>
           <ac:spMkLst>
             <pc:docMk/>
             <pc:sldMk cId="2035144677" sldId="648"/>
@@ -341,7 +381,7 @@
           </ac:spMkLst>
         </pc:spChg>
         <pc:spChg chg="add mod">
-          <ac:chgData name="Sophianne Loh" userId="8637b7878f47fa27" providerId="LiveId" clId="{253E96B1-2C3E-416C-9E95-B50C92096C5C}" dt="2025-04-29T20:41:46.292" v="164" actId="255"/>
+          <ac:chgData name="Sophianne Loh" userId="8637b7878f47fa27" providerId="LiveId" clId="{253E96B1-2C3E-416C-9E95-B50C92096C5C}" dt="2025-05-04T20:59:50.549" v="369" actId="571"/>
           <ac:spMkLst>
             <pc:docMk/>
             <pc:sldMk cId="2035144677" sldId="648"/>
@@ -349,7 +389,7 @@
           </ac:spMkLst>
         </pc:spChg>
         <pc:spChg chg="add mod">
-          <ac:chgData name="Sophianne Loh" userId="8637b7878f47fa27" providerId="LiveId" clId="{253E96B1-2C3E-416C-9E95-B50C92096C5C}" dt="2025-05-03T19:46:59.578" v="314" actId="1076"/>
+          <ac:chgData name="Sophianne Loh" userId="8637b7878f47fa27" providerId="LiveId" clId="{253E96B1-2C3E-416C-9E95-B50C92096C5C}" dt="2025-05-04T20:59:51.470" v="370"/>
           <ac:spMkLst>
             <pc:docMk/>
             <pc:sldMk cId="2035144677" sldId="648"/>
@@ -372,32 +412,24 @@
             <ac:spMk id="56" creationId="{ADDD49BC-4C4D-97B6-DDF3-10A4576B3B7F}"/>
           </ac:spMkLst>
         </pc:spChg>
-        <pc:spChg chg="del mod">
-          <ac:chgData name="Sophianne Loh" userId="8637b7878f47fa27" providerId="LiveId" clId="{253E96B1-2C3E-416C-9E95-B50C92096C5C}" dt="2025-05-03T19:36:27.335" v="232" actId="478"/>
+        <pc:spChg chg="mod">
+          <ac:chgData name="Sophianne Loh" userId="8637b7878f47fa27" providerId="LiveId" clId="{253E96B1-2C3E-416C-9E95-B50C92096C5C}" dt="2025-05-04T19:57:49.304" v="361" actId="1076"/>
           <ac:spMkLst>
             <pc:docMk/>
             <pc:sldMk cId="2035144677" sldId="648"/>
-            <ac:spMk id="59" creationId="{35F0DFD6-9C91-49AA-2F06-63CB774A3FA4}"/>
+            <ac:spMk id="59" creationId="{FC7C3527-B807-3631-E026-D20C7D5F6226}"/>
           </ac:spMkLst>
         </pc:spChg>
-        <pc:spChg chg="del mod">
-          <ac:chgData name="Sophianne Loh" userId="8637b7878f47fa27" providerId="LiveId" clId="{253E96B1-2C3E-416C-9E95-B50C92096C5C}" dt="2025-05-03T19:36:13.944" v="227" actId="478"/>
-          <ac:spMkLst>
-            <pc:docMk/>
-            <pc:sldMk cId="2035144677" sldId="648"/>
-            <ac:spMk id="60" creationId="{7BAD8D71-2B6E-91A2-A01F-4A28976249DB}"/>
-          </ac:spMkLst>
-        </pc:spChg>
-        <pc:spChg chg="add mod">
-          <ac:chgData name="Sophianne Loh" userId="8637b7878f47fa27" providerId="LiveId" clId="{253E96B1-2C3E-416C-9E95-B50C92096C5C}" dt="2025-05-03T19:44:04.875" v="292" actId="1076"/>
+        <pc:spChg chg="add mod topLvl">
+          <ac:chgData name="Sophianne Loh" userId="8637b7878f47fa27" providerId="LiveId" clId="{253E96B1-2C3E-416C-9E95-B50C92096C5C}" dt="2025-05-05T02:17:45.152" v="397" actId="1076"/>
           <ac:spMkLst>
             <pc:docMk/>
             <pc:sldMk cId="2035144677" sldId="648"/>
             <ac:spMk id="61" creationId="{C276F147-3873-5688-E70A-DD2480A465BB}"/>
           </ac:spMkLst>
         </pc:spChg>
-        <pc:spChg chg="add mod">
-          <ac:chgData name="Sophianne Loh" userId="8637b7878f47fa27" providerId="LiveId" clId="{253E96B1-2C3E-416C-9E95-B50C92096C5C}" dt="2025-05-03T19:43:17.994" v="286" actId="164"/>
+        <pc:spChg chg="add del mod topLvl">
+          <ac:chgData name="Sophianne Loh" userId="8637b7878f47fa27" providerId="LiveId" clId="{253E96B1-2C3E-416C-9E95-B50C92096C5C}" dt="2025-05-04T20:59:43.979" v="366" actId="478"/>
           <ac:spMkLst>
             <pc:docMk/>
             <pc:sldMk cId="2035144677" sldId="648"/>
@@ -405,7 +437,7 @@
           </ac:spMkLst>
         </pc:spChg>
         <pc:spChg chg="mod">
-          <ac:chgData name="Sophianne Loh" userId="8637b7878f47fa27" providerId="LiveId" clId="{253E96B1-2C3E-416C-9E95-B50C92096C5C}" dt="2025-05-03T19:40:14.156" v="267" actId="1076"/>
+          <ac:chgData name="Sophianne Loh" userId="8637b7878f47fa27" providerId="LiveId" clId="{253E96B1-2C3E-416C-9E95-B50C92096C5C}" dt="2025-05-04T20:59:50.549" v="369" actId="571"/>
           <ac:spMkLst>
             <pc:docMk/>
             <pc:sldMk cId="2035144677" sldId="648"/>
@@ -413,7 +445,31 @@
           </ac:spMkLst>
         </pc:spChg>
         <pc:spChg chg="mod">
-          <ac:chgData name="Sophianne Loh" userId="8637b7878f47fa27" providerId="LiveId" clId="{253E96B1-2C3E-416C-9E95-B50C92096C5C}" dt="2025-05-03T19:40:19.824" v="268"/>
+          <ac:chgData name="Sophianne Loh" userId="8637b7878f47fa27" providerId="LiveId" clId="{253E96B1-2C3E-416C-9E95-B50C92096C5C}" dt="2025-05-04T19:57:50.326" v="362"/>
+          <ac:spMkLst>
+            <pc:docMk/>
+            <pc:sldMk cId="2035144677" sldId="648"/>
+            <ac:spMk id="69" creationId="{1C47EBE2-7A26-DCD5-542F-6C8864D6C5A9}"/>
+          </ac:spMkLst>
+        </pc:spChg>
+        <pc:spChg chg="mod">
+          <ac:chgData name="Sophianne Loh" userId="8637b7878f47fa27" providerId="LiveId" clId="{253E96B1-2C3E-416C-9E95-B50C92096C5C}" dt="2025-05-04T19:58:00.335" v="364" actId="1076"/>
+          <ac:spMkLst>
+            <pc:docMk/>
+            <pc:sldMk cId="2035144677" sldId="648"/>
+            <ac:spMk id="70" creationId="{B14EB552-07BC-B147-729F-9E1CFEF28796}"/>
+          </ac:spMkLst>
+        </pc:spChg>
+        <pc:spChg chg="add mod">
+          <ac:chgData name="Sophianne Loh" userId="8637b7878f47fa27" providerId="LiveId" clId="{253E96B1-2C3E-416C-9E95-B50C92096C5C}" dt="2025-05-05T02:17:33.201" v="393" actId="1076"/>
+          <ac:spMkLst>
+            <pc:docMk/>
+            <pc:sldMk cId="2035144677" sldId="648"/>
+            <ac:spMk id="72" creationId="{4A816216-0EAB-B71F-3E18-5122FD395FAC}"/>
+          </ac:spMkLst>
+        </pc:spChg>
+        <pc:spChg chg="mod">
+          <ac:chgData name="Sophianne Loh" userId="8637b7878f47fa27" providerId="LiveId" clId="{253E96B1-2C3E-416C-9E95-B50C92096C5C}" dt="2025-05-04T20:59:50.549" v="369" actId="571"/>
           <ac:spMkLst>
             <pc:docMk/>
             <pc:sldMk cId="2035144677" sldId="648"/>
@@ -444,20 +500,60 @@
             <ac:grpSpMk id="3" creationId="{C3549374-1492-D26D-12A9-F6D2718EF76E}"/>
           </ac:grpSpMkLst>
         </pc:grpChg>
-        <pc:grpChg chg="add del mod ord">
-          <ac:chgData name="Sophianne Loh" userId="8637b7878f47fa27" providerId="LiveId" clId="{253E96B1-2C3E-416C-9E95-B50C92096C5C}" dt="2025-05-03T19:36:48.947" v="239" actId="478"/>
+        <pc:grpChg chg="add mod">
+          <ac:chgData name="Sophianne Loh" userId="8637b7878f47fa27" providerId="LiveId" clId="{253E96B1-2C3E-416C-9E95-B50C92096C5C}" dt="2025-05-04T19:56:34.397" v="342" actId="164"/>
           <ac:grpSpMkLst>
             <pc:docMk/>
             <pc:sldMk cId="2035144677" sldId="648"/>
-            <ac:grpSpMk id="16" creationId="{FC42E2CD-AC4E-C7D9-640A-BF961F1E3749}"/>
+            <ac:grpSpMk id="16" creationId="{E8FC2BFB-1950-AF34-6E2F-9B2C0883234A}"/>
           </ac:grpSpMkLst>
         </pc:grpChg>
-        <pc:grpChg chg="del">
-          <ac:chgData name="Sophianne Loh" userId="8637b7878f47fa27" providerId="LiveId" clId="{253E96B1-2C3E-416C-9E95-B50C92096C5C}" dt="2025-05-03T19:36:45.383" v="238" actId="478"/>
+        <pc:grpChg chg="add mod">
+          <ac:chgData name="Sophianne Loh" userId="8637b7878f47fa27" providerId="LiveId" clId="{253E96B1-2C3E-416C-9E95-B50C92096C5C}" dt="2025-05-04T19:56:54.321" v="346" actId="14100"/>
           <ac:grpSpMkLst>
             <pc:docMk/>
             <pc:sldMk cId="2035144677" sldId="648"/>
-            <ac:grpSpMk id="17" creationId="{8704D84D-430A-7F07-A811-E0FBC42B75BE}"/>
+            <ac:grpSpMk id="17" creationId="{861A830D-4259-70B4-9805-6C67EB74A58C}"/>
+          </ac:grpSpMkLst>
+        </pc:grpChg>
+        <pc:grpChg chg="add mod">
+          <ac:chgData name="Sophianne Loh" userId="8637b7878f47fa27" providerId="LiveId" clId="{253E96B1-2C3E-416C-9E95-B50C92096C5C}" dt="2025-05-04T19:57:11.240" v="349" actId="1076"/>
+          <ac:grpSpMkLst>
+            <pc:docMk/>
+            <pc:sldMk cId="2035144677" sldId="648"/>
+            <ac:grpSpMk id="22" creationId="{81928EB0-FFDC-D8AF-A247-1A858DA01150}"/>
+          </ac:grpSpMkLst>
+        </pc:grpChg>
+        <pc:grpChg chg="add mod">
+          <ac:chgData name="Sophianne Loh" userId="8637b7878f47fa27" providerId="LiveId" clId="{253E96B1-2C3E-416C-9E95-B50C92096C5C}" dt="2025-05-04T19:57:22.664" v="352" actId="1076"/>
+          <ac:grpSpMkLst>
+            <pc:docMk/>
+            <pc:sldMk cId="2035144677" sldId="648"/>
+            <ac:grpSpMk id="31" creationId="{A6AA5BC8-A030-C511-894C-87BC0782DE4F}"/>
+          </ac:grpSpMkLst>
+        </pc:grpChg>
+        <pc:grpChg chg="add mod">
+          <ac:chgData name="Sophianne Loh" userId="8637b7878f47fa27" providerId="LiveId" clId="{253E96B1-2C3E-416C-9E95-B50C92096C5C}" dt="2025-05-04T19:57:32.294" v="355" actId="1076"/>
+          <ac:grpSpMkLst>
+            <pc:docMk/>
+            <pc:sldMk cId="2035144677" sldId="648"/>
+            <ac:grpSpMk id="34" creationId="{B22538A9-3E81-1045-B72D-E74A5DD39106}"/>
+          </ac:grpSpMkLst>
+        </pc:grpChg>
+        <pc:grpChg chg="add mod">
+          <ac:chgData name="Sophianne Loh" userId="8637b7878f47fa27" providerId="LiveId" clId="{253E96B1-2C3E-416C-9E95-B50C92096C5C}" dt="2025-05-04T19:57:37.677" v="357" actId="1076"/>
+          <ac:grpSpMkLst>
+            <pc:docMk/>
+            <pc:sldMk cId="2035144677" sldId="648"/>
+            <ac:grpSpMk id="38" creationId="{F3AE3F46-7EDC-D760-4C31-FC8DD7BEE8DA}"/>
+          </ac:grpSpMkLst>
+        </pc:grpChg>
+        <pc:grpChg chg="add mod">
+          <ac:chgData name="Sophianne Loh" userId="8637b7878f47fa27" providerId="LiveId" clId="{253E96B1-2C3E-416C-9E95-B50C92096C5C}" dt="2025-05-04T19:57:45.349" v="360" actId="1076"/>
+          <ac:grpSpMkLst>
+            <pc:docMk/>
+            <pc:sldMk cId="2035144677" sldId="648"/>
+            <ac:grpSpMk id="45" creationId="{AB889C41-22E4-52F2-A1D1-8FC7C14B8165}"/>
           </ac:grpSpMkLst>
         </pc:grpChg>
         <pc:grpChg chg="mod">
@@ -485,6 +581,14 @@
           </ac:grpSpMkLst>
         </pc:grpChg>
         <pc:grpChg chg="add mod">
+          <ac:chgData name="Sophianne Loh" userId="8637b7878f47fa27" providerId="LiveId" clId="{253E96B1-2C3E-416C-9E95-B50C92096C5C}" dt="2025-05-04T19:57:56.616" v="363" actId="1076"/>
+          <ac:grpSpMkLst>
+            <pc:docMk/>
+            <pc:sldMk cId="2035144677" sldId="648"/>
+            <ac:grpSpMk id="60" creationId="{5A68D6CC-8F23-C786-15EF-831DFE4F247C}"/>
+          </ac:grpSpMkLst>
+        </pc:grpChg>
+        <pc:grpChg chg="add mod">
           <ac:chgData name="Sophianne Loh" userId="8637b7878f47fa27" providerId="LiveId" clId="{253E96B1-2C3E-416C-9E95-B50C92096C5C}" dt="2025-05-03T19:42:44.347" v="280" actId="164"/>
           <ac:grpSpMkLst>
             <pc:docMk/>
@@ -508,8 +612,8 @@
             <ac:grpSpMk id="87" creationId="{148B749A-6C9D-7E9C-131E-186021D03B4A}"/>
           </ac:grpSpMkLst>
         </pc:grpChg>
-        <pc:grpChg chg="add mod">
-          <ac:chgData name="Sophianne Loh" userId="8637b7878f47fa27" providerId="LiveId" clId="{253E96B1-2C3E-416C-9E95-B50C92096C5C}" dt="2025-05-03T19:44:16.432" v="295" actId="688"/>
+        <pc:grpChg chg="add del mod">
+          <ac:chgData name="Sophianne Loh" userId="8637b7878f47fa27" providerId="LiveId" clId="{253E96B1-2C3E-416C-9E95-B50C92096C5C}" dt="2025-05-04T20:59:43.979" v="366" actId="478"/>
           <ac:grpSpMkLst>
             <pc:docMk/>
             <pc:sldMk cId="2035144677" sldId="648"/>
@@ -596,30 +700,6 @@
             <ac:cxnSpMk id="13" creationId="{B836AD67-4D01-83FB-D009-E732B30F4F70}"/>
           </ac:cxnSpMkLst>
         </pc:cxnChg>
-        <pc:cxnChg chg="del">
-          <ac:chgData name="Sophianne Loh" userId="8637b7878f47fa27" providerId="LiveId" clId="{253E96B1-2C3E-416C-9E95-B50C92096C5C}" dt="2025-05-03T19:35:51.863" v="215" actId="478"/>
-          <ac:cxnSpMkLst>
-            <pc:docMk/>
-            <pc:sldMk cId="2035144677" sldId="648"/>
-            <ac:cxnSpMk id="20" creationId="{5B7F025F-0A46-B084-9897-C8B5D3F20BFE}"/>
-          </ac:cxnSpMkLst>
-        </pc:cxnChg>
-        <pc:cxnChg chg="del">
-          <ac:chgData name="Sophianne Loh" userId="8637b7878f47fa27" providerId="LiveId" clId="{253E96B1-2C3E-416C-9E95-B50C92096C5C}" dt="2025-05-03T19:35:56.682" v="219" actId="478"/>
-          <ac:cxnSpMkLst>
-            <pc:docMk/>
-            <pc:sldMk cId="2035144677" sldId="648"/>
-            <ac:cxnSpMk id="22" creationId="{F62C8ECE-3725-E3AD-0633-8B2CCCBC5C4D}"/>
-          </ac:cxnSpMkLst>
-        </pc:cxnChg>
-        <pc:cxnChg chg="del">
-          <ac:chgData name="Sophianne Loh" userId="8637b7878f47fa27" providerId="LiveId" clId="{253E96B1-2C3E-416C-9E95-B50C92096C5C}" dt="2025-05-03T19:36:42.562" v="237" actId="478"/>
-          <ac:cxnSpMkLst>
-            <pc:docMk/>
-            <pc:sldMk cId="2035144677" sldId="648"/>
-            <ac:cxnSpMk id="23" creationId="{BF5C7724-C9D1-4B44-4BF5-92CDCE492132}"/>
-          </ac:cxnSpMkLst>
-        </pc:cxnChg>
         <pc:cxnChg chg="add mod">
           <ac:chgData name="Sophianne Loh" userId="8637b7878f47fa27" providerId="LiveId" clId="{253E96B1-2C3E-416C-9E95-B50C92096C5C}" dt="2025-05-03T19:47:32.966" v="315" actId="1076"/>
           <ac:cxnSpMkLst>
@@ -650,46 +730,6 @@
             <pc:docMk/>
             <pc:sldMk cId="2035144677" sldId="648"/>
             <ac:cxnSpMk id="29" creationId="{68738CCB-12F5-1C33-C7BD-57665603FE6C}"/>
-          </ac:cxnSpMkLst>
-        </pc:cxnChg>
-        <pc:cxnChg chg="del">
-          <ac:chgData name="Sophianne Loh" userId="8637b7878f47fa27" providerId="LiveId" clId="{253E96B1-2C3E-416C-9E95-B50C92096C5C}" dt="2025-05-03T19:36:36.848" v="234" actId="478"/>
-          <ac:cxnSpMkLst>
-            <pc:docMk/>
-            <pc:sldMk cId="2035144677" sldId="648"/>
-            <ac:cxnSpMk id="30" creationId="{FFA5A4FD-ABC0-5D19-1F07-37BA438E1BDE}"/>
-          </ac:cxnSpMkLst>
-        </pc:cxnChg>
-        <pc:cxnChg chg="del topLvl">
-          <ac:chgData name="Sophianne Loh" userId="8637b7878f47fa27" providerId="LiveId" clId="{253E96B1-2C3E-416C-9E95-B50C92096C5C}" dt="2025-05-03T19:36:48.947" v="239" actId="478"/>
-          <ac:cxnSpMkLst>
-            <pc:docMk/>
-            <pc:sldMk cId="2035144677" sldId="648"/>
-            <ac:cxnSpMk id="32" creationId="{28435C47-CC13-D7D1-D40A-3387F734C4EB}"/>
-          </ac:cxnSpMkLst>
-        </pc:cxnChg>
-        <pc:cxnChg chg="del">
-          <ac:chgData name="Sophianne Loh" userId="8637b7878f47fa27" providerId="LiveId" clId="{253E96B1-2C3E-416C-9E95-B50C92096C5C}" dt="2025-05-03T19:36:45.383" v="238" actId="478"/>
-          <ac:cxnSpMkLst>
-            <pc:docMk/>
-            <pc:sldMk cId="2035144677" sldId="648"/>
-            <ac:cxnSpMk id="33" creationId="{7C55A28D-6B9A-9D5D-35EC-16F58789DDD0}"/>
-          </ac:cxnSpMkLst>
-        </pc:cxnChg>
-        <pc:cxnChg chg="del">
-          <ac:chgData name="Sophianne Loh" userId="8637b7878f47fa27" providerId="LiveId" clId="{253E96B1-2C3E-416C-9E95-B50C92096C5C}" dt="2025-05-03T19:36:29.487" v="233" actId="478"/>
-          <ac:cxnSpMkLst>
-            <pc:docMk/>
-            <pc:sldMk cId="2035144677" sldId="648"/>
-            <ac:cxnSpMk id="34" creationId="{4713AEE5-0F9F-10CB-86BB-0C0B3F4C1761}"/>
-          </ac:cxnSpMkLst>
-        </pc:cxnChg>
-        <pc:cxnChg chg="del">
-          <ac:chgData name="Sophianne Loh" userId="8637b7878f47fa27" providerId="LiveId" clId="{253E96B1-2C3E-416C-9E95-B50C92096C5C}" dt="2025-05-03T19:36:19.615" v="230" actId="478"/>
-          <ac:cxnSpMkLst>
-            <pc:docMk/>
-            <pc:sldMk cId="2035144677" sldId="648"/>
-            <ac:cxnSpMk id="37" creationId="{8894B977-F4E1-F2B6-E913-19906CAD7557}"/>
           </ac:cxnSpMkLst>
         </pc:cxnChg>
         <pc:cxnChg chg="add mod">
@@ -859,102 +899,6 @@
           <pc:docMk/>
           <pc:sldMk cId="4007920328" sldId="649"/>
         </pc:sldMkLst>
-        <pc:spChg chg="mod">
-          <ac:chgData name="Sophianne Loh" userId="8637b7878f47fa27" providerId="LiveId" clId="{253E96B1-2C3E-416C-9E95-B50C92096C5C}" dt="2025-05-03T19:32:57.964" v="190" actId="164"/>
-          <ac:spMkLst>
-            <pc:docMk/>
-            <pc:sldMk cId="4007920328" sldId="649"/>
-            <ac:spMk id="26" creationId="{7750519F-3890-4921-B9C9-95ACBFFB38A1}"/>
-          </ac:spMkLst>
-        </pc:spChg>
-        <pc:spChg chg="mod">
-          <ac:chgData name="Sophianne Loh" userId="8637b7878f47fa27" providerId="LiveId" clId="{253E96B1-2C3E-416C-9E95-B50C92096C5C}" dt="2025-05-03T19:38:21.950" v="242" actId="164"/>
-          <ac:spMkLst>
-            <pc:docMk/>
-            <pc:sldMk cId="4007920328" sldId="649"/>
-            <ac:spMk id="35" creationId="{9E10DE7A-85DE-44CA-A19E-899BAB1CD3CD}"/>
-          </ac:spMkLst>
-        </pc:spChg>
-        <pc:grpChg chg="add mod">
-          <ac:chgData name="Sophianne Loh" userId="8637b7878f47fa27" providerId="LiveId" clId="{253E96B1-2C3E-416C-9E95-B50C92096C5C}" dt="2025-05-03T19:32:57.964" v="190" actId="164"/>
-          <ac:grpSpMkLst>
-            <pc:docMk/>
-            <pc:sldMk cId="4007920328" sldId="649"/>
-            <ac:grpSpMk id="5" creationId="{2BA0B17A-44D4-F57F-0511-74300473A1A6}"/>
-          </ac:grpSpMkLst>
-        </pc:grpChg>
-        <pc:grpChg chg="add mod">
-          <ac:chgData name="Sophianne Loh" userId="8637b7878f47fa27" providerId="LiveId" clId="{253E96B1-2C3E-416C-9E95-B50C92096C5C}" dt="2025-05-03T19:38:21.950" v="242" actId="164"/>
-          <ac:grpSpMkLst>
-            <pc:docMk/>
-            <pc:sldMk cId="4007920328" sldId="649"/>
-            <ac:grpSpMk id="7" creationId="{32C4D7FD-5193-A6BE-306B-B0F2CDB853E6}"/>
-          </ac:grpSpMkLst>
-        </pc:grpChg>
-        <pc:cxnChg chg="mod">
-          <ac:chgData name="Sophianne Loh" userId="8637b7878f47fa27" providerId="LiveId" clId="{253E96B1-2C3E-416C-9E95-B50C92096C5C}" dt="2025-05-03T19:32:57.964" v="190" actId="164"/>
-          <ac:cxnSpMkLst>
-            <pc:docMk/>
-            <pc:sldMk cId="4007920328" sldId="649"/>
-            <ac:cxnSpMk id="16" creationId="{FBF5F94E-201E-43C0-B6FB-7EE9B9A0AF0D}"/>
-          </ac:cxnSpMkLst>
-        </pc:cxnChg>
-        <pc:cxnChg chg="mod">
-          <ac:chgData name="Sophianne Loh" userId="8637b7878f47fa27" providerId="LiveId" clId="{253E96B1-2C3E-416C-9E95-B50C92096C5C}" dt="2025-05-03T19:32:57.964" v="190" actId="164"/>
-          <ac:cxnSpMkLst>
-            <pc:docMk/>
-            <pc:sldMk cId="4007920328" sldId="649"/>
-            <ac:cxnSpMk id="17" creationId="{E614C90A-940E-42D8-A358-80D711F6CA37}"/>
-          </ac:cxnSpMkLst>
-        </pc:cxnChg>
-        <pc:cxnChg chg="mod">
-          <ac:chgData name="Sophianne Loh" userId="8637b7878f47fa27" providerId="LiveId" clId="{253E96B1-2C3E-416C-9E95-B50C92096C5C}" dt="2025-05-03T19:32:57.964" v="190" actId="164"/>
-          <ac:cxnSpMkLst>
-            <pc:docMk/>
-            <pc:sldMk cId="4007920328" sldId="649"/>
-            <ac:cxnSpMk id="22" creationId="{D633D62C-FD77-4DFB-A1B3-28579B58CC8C}"/>
-          </ac:cxnSpMkLst>
-        </pc:cxnChg>
-        <pc:cxnChg chg="mod">
-          <ac:chgData name="Sophianne Loh" userId="8637b7878f47fa27" providerId="LiveId" clId="{253E96B1-2C3E-416C-9E95-B50C92096C5C}" dt="2025-05-03T19:38:21.950" v="242" actId="164"/>
-          <ac:cxnSpMkLst>
-            <pc:docMk/>
-            <pc:sldMk cId="4007920328" sldId="649"/>
-            <ac:cxnSpMk id="31" creationId="{4FBC3842-8C76-4772-8C56-A42981AFAA0F}"/>
-          </ac:cxnSpMkLst>
-        </pc:cxnChg>
-        <pc:cxnChg chg="mod">
-          <ac:chgData name="Sophianne Loh" userId="8637b7878f47fa27" providerId="LiveId" clId="{253E96B1-2C3E-416C-9E95-B50C92096C5C}" dt="2025-05-03T19:38:21.950" v="242" actId="164"/>
-          <ac:cxnSpMkLst>
-            <pc:docMk/>
-            <pc:sldMk cId="4007920328" sldId="649"/>
-            <ac:cxnSpMk id="32" creationId="{539E09FA-9DC4-436A-B40C-B4AA502C1E64}"/>
-          </ac:cxnSpMkLst>
-        </pc:cxnChg>
-        <pc:cxnChg chg="mod">
-          <ac:chgData name="Sophianne Loh" userId="8637b7878f47fa27" providerId="LiveId" clId="{253E96B1-2C3E-416C-9E95-B50C92096C5C}" dt="2025-05-03T19:38:21.950" v="242" actId="164"/>
-          <ac:cxnSpMkLst>
-            <pc:docMk/>
-            <pc:sldMk cId="4007920328" sldId="649"/>
-            <ac:cxnSpMk id="33" creationId="{35B523AB-0A63-4448-840A-ED287867CF4F}"/>
-          </ac:cxnSpMkLst>
-        </pc:cxnChg>
-        <pc:cxnChg chg="mod">
-          <ac:chgData name="Sophianne Loh" userId="8637b7878f47fa27" providerId="LiveId" clId="{253E96B1-2C3E-416C-9E95-B50C92096C5C}" dt="2025-05-03T19:38:21.950" v="242" actId="164"/>
-          <ac:cxnSpMkLst>
-            <pc:docMk/>
-            <pc:sldMk cId="4007920328" sldId="649"/>
-            <ac:cxnSpMk id="34" creationId="{B573D08D-085E-4E5B-9D6E-3C101A50AE3D}"/>
-          </ac:cxnSpMkLst>
-        </pc:cxnChg>
-        <pc:cxnChg chg="mod">
-          <ac:chgData name="Sophianne Loh" userId="8637b7878f47fa27" providerId="LiveId" clId="{253E96B1-2C3E-416C-9E95-B50C92096C5C}" dt="2025-05-03T19:32:57.964" v="190" actId="164"/>
-          <ac:cxnSpMkLst>
-            <pc:docMk/>
-            <pc:sldMk cId="4007920328" sldId="649"/>
-            <ac:cxnSpMk id="68" creationId="{A875D76E-B3DD-41FC-99E2-B01894E7D87F}"/>
-          </ac:cxnSpMkLst>
-        </pc:cxnChg>
       </pc:sldChg>
       <pc:sldChg chg="del">
         <pc:chgData name="Sophianne Loh" userId="8637b7878f47fa27" providerId="LiveId" clId="{253E96B1-2C3E-416C-9E95-B50C92096C5C}" dt="2025-05-03T20:33:31.778" v="319" actId="2696"/>
@@ -1050,7 +994,7 @@
           <a:p>
             <a:fld id="{59041DB8-B66F-4DC8-A96E-33677E0F90FF}" type="datetimeFigureOut">
               <a:rPr lang="en-US" smtClean="0"/>
-              <a:t>5/3/2025</a:t>
+              <a:t>5/4/2025</a:t>
             </a:fld>
             <a:endParaRPr lang="en-US"/>
           </a:p>
@@ -1215,7 +1159,7 @@
           <a:p>
             <a:fld id="{DEB49C4A-65AC-492D-9701-81B46C3AD0E4}" type="datetimeFigureOut">
               <a:rPr lang="en-US" smtClean="0"/>
-              <a:t>5/3/2025</a:t>
+              <a:t>5/4/2025</a:t>
             </a:fld>
             <a:endParaRPr lang="en-US"/>
           </a:p>
@@ -3623,7 +3567,7 @@
           <a:p>
             <a:fld id="{384A29A4-78C8-47AB-BA06-22CB45938951}" type="datetime1">
               <a:rPr lang="en-US" smtClean="0"/>
-              <a:t>5/3/2025</a:t>
+              <a:t>5/4/2025</a:t>
             </a:fld>
             <a:endParaRPr lang="en-US"/>
           </a:p>
@@ -3818,7 +3762,7 @@
           <a:p>
             <a:fld id="{E1ED4ACF-2D82-46F2-A8E9-23963AA34E86}" type="datetime1">
               <a:rPr lang="en-US" smtClean="0"/>
-              <a:t>5/3/2025</a:t>
+              <a:t>5/4/2025</a:t>
             </a:fld>
             <a:endParaRPr lang="en-US"/>
           </a:p>
@@ -4012,7 +3956,7 @@
           <a:p>
             <a:fld id="{AE374B5B-21A0-4192-BF4C-38187F1A68D8}" type="datetime1">
               <a:rPr lang="en-US" smtClean="0"/>
-              <a:t>5/3/2025</a:t>
+              <a:t>5/4/2025</a:t>
             </a:fld>
             <a:endParaRPr lang="en-US"/>
           </a:p>
@@ -6353,7 +6297,7 @@
           <a:p>
             <a:fld id="{33B5CF7C-B333-48E1-A4A6-83A3C8B73AC0}" type="datetime1">
               <a:rPr lang="en-US" smtClean="0"/>
-              <a:t>5/3/2025</a:t>
+              <a:t>5/4/2025</a:t>
             </a:fld>
             <a:endParaRPr lang="en-US"/>
           </a:p>
@@ -6806,7 +6750,7 @@
           <a:p>
             <a:fld id="{AE320762-5CBF-4210-AB54-376B091119F8}" type="datetime1">
               <a:rPr lang="en-US" smtClean="0"/>
-              <a:t>5/3/2025</a:t>
+              <a:t>5/4/2025</a:t>
             </a:fld>
             <a:endParaRPr lang="en-US"/>
           </a:p>
@@ -6938,7 +6882,7 @@
           <a:p>
             <a:fld id="{7F0DB371-BF5F-4058-A212-1A908E4D2674}" type="datetime1">
               <a:rPr lang="en-US" smtClean="0"/>
-              <a:t>5/3/2025</a:t>
+              <a:t>5/4/2025</a:t>
             </a:fld>
             <a:endParaRPr lang="en-US"/>
           </a:p>
@@ -8871,7 +8815,7 @@
           <a:p>
             <a:fld id="{60A4083B-90AA-48CF-BAD5-00AA24D7F288}" type="datetime1">
               <a:rPr lang="en-US" smtClean="0"/>
-              <a:t>5/3/2025</a:t>
+              <a:t>5/4/2025</a:t>
             </a:fld>
             <a:endParaRPr lang="en-US"/>
           </a:p>
@@ -11130,7 +11074,7 @@
             <a:fld id="{F5BAF629-ECA2-4CF3-B790-9D9BDED98269}" type="datetime1">
               <a:rPr lang="en-US" smtClean="0"/>
               <a:pPr/>
-              <a:t>5/3/2025</a:t>
+              <a:t>5/4/2025</a:t>
             </a:fld>
             <a:endParaRPr lang="en-US"/>
           </a:p>
@@ -15425,7 +15369,7 @@
             <a:fld id="{B51B2453-8663-4C69-AF73-9FD7B1DEC5D0}" type="datetime1">
               <a:rPr lang="en-US" smtClean="0"/>
               <a:pPr/>
-              <a:t>5/3/2025</a:t>
+              <a:t>5/4/2025</a:t>
             </a:fld>
             <a:endParaRPr lang="en-US" dirty="0"/>
           </a:p>
@@ -22724,7 +22668,7 @@
         </p:nvSpPr>
         <p:spPr>
           <a:xfrm>
-            <a:off x="6389706" y="1123951"/>
+            <a:off x="6385824" y="1123952"/>
             <a:ext cx="5295900" cy="4152900"/>
           </a:xfrm>
           <a:prstGeom prst="rect">
@@ -23318,111 +23262,55 @@
           </p:style>
         </p:cxnSp>
       </p:grpSp>
-      <p:grpSp>
-        <p:nvGrpSpPr>
-          <p:cNvPr id="88" name="Group 87">
+      <p:sp>
+        <p:nvSpPr>
+          <p:cNvPr id="61" name="Rectangle 60">
             <a:extLst>
               <a:ext uri="{FF2B5EF4-FFF2-40B4-BE49-F238E27FC236}">
-                <a16:creationId xmlns:a16="http://schemas.microsoft.com/office/drawing/2014/main" id="{B70A309D-6642-DCE5-D831-FDC22795EB9E}"/>
+                <a16:creationId xmlns:a16="http://schemas.microsoft.com/office/drawing/2014/main" id="{C276F147-3873-5688-E70A-DD2480A465BB}"/>
               </a:ext>
             </a:extLst>
           </p:cNvPr>
-          <p:cNvGrpSpPr/>
+          <p:cNvSpPr/>
           <p:nvPr/>
-        </p:nvGrpSpPr>
-        <p:grpSpPr>
-          <a:xfrm rot="16200000">
-            <a:off x="7356181" y="1950377"/>
+        </p:nvSpPr>
+        <p:spPr>
+          <a:xfrm>
+            <a:off x="6916130" y="2305479"/>
             <a:ext cx="3352800" cy="1905000"/>
-            <a:chOff x="8077200" y="2057400"/>
-            <a:chExt cx="3352800" cy="1905000"/>
           </a:xfrm>
-        </p:grpSpPr>
-        <p:sp>
-          <p:nvSpPr>
-            <p:cNvPr id="61" name="Rectangle 60">
-              <a:extLst>
-                <a:ext uri="{FF2B5EF4-FFF2-40B4-BE49-F238E27FC236}">
-                  <a16:creationId xmlns:a16="http://schemas.microsoft.com/office/drawing/2014/main" id="{C276F147-3873-5688-E70A-DD2480A465BB}"/>
-                </a:ext>
-              </a:extLst>
-            </p:cNvPr>
-            <p:cNvSpPr/>
-            <p:nvPr/>
-          </p:nvSpPr>
-          <p:spPr>
-            <a:xfrm>
-              <a:off x="8077200" y="2057400"/>
-              <a:ext cx="3352800" cy="1905000"/>
-            </a:xfrm>
-            <a:prstGeom prst="rect">
-              <a:avLst/>
-            </a:prstGeom>
-          </p:spPr>
-          <p:style>
-            <a:lnRef idx="2">
-              <a:schemeClr val="accent1">
-                <a:shade val="50000"/>
-              </a:schemeClr>
-            </a:lnRef>
-            <a:fillRef idx="1">
-              <a:schemeClr val="accent1"/>
-            </a:fillRef>
-            <a:effectRef idx="0">
-              <a:schemeClr val="accent1"/>
-            </a:effectRef>
-            <a:fontRef idx="minor">
-              <a:schemeClr val="lt1"/>
-            </a:fontRef>
-          </p:style>
-          <p:txBody>
-            <a:bodyPr rtlCol="0" anchor="ctr"/>
-            <a:lstStyle/>
-            <a:p>
-              <a:pPr algn="ctr"/>
-              <a:r>
-                <a:rPr lang="en-US" dirty="0"/>
-                <a:t>Pocket Beagle</a:t>
-              </a:r>
-            </a:p>
-          </p:txBody>
-        </p:sp>
-        <p:sp>
-          <p:nvSpPr>
-            <p:cNvPr id="62" name="TextBox 61">
-              <a:extLst>
-                <a:ext uri="{FF2B5EF4-FFF2-40B4-BE49-F238E27FC236}">
-                  <a16:creationId xmlns:a16="http://schemas.microsoft.com/office/drawing/2014/main" id="{93C61110-3E5D-5F9A-1507-B3A44F4CE2E8}"/>
-                </a:ext>
-              </a:extLst>
-            </p:cNvPr>
-            <p:cNvSpPr txBox="1"/>
-            <p:nvPr/>
-          </p:nvSpPr>
-          <p:spPr>
-            <a:xfrm rot="16200000">
-              <a:off x="10904089" y="2811911"/>
-              <a:ext cx="659155" cy="369332"/>
-            </a:xfrm>
-            <a:prstGeom prst="rect">
-              <a:avLst/>
-            </a:prstGeom>
-            <a:noFill/>
-          </p:spPr>
-          <p:txBody>
-            <a:bodyPr wrap="none" rtlCol="0">
-              <a:spAutoFit/>
-            </a:bodyPr>
-            <a:lstStyle/>
-            <a:p>
-              <a:r>
-                <a:rPr lang="en-US" dirty="0"/>
-                <a:t>USB</a:t>
-              </a:r>
-            </a:p>
-          </p:txBody>
-        </p:sp>
-      </p:grpSp>
+          <a:prstGeom prst="rect">
+            <a:avLst/>
+          </a:prstGeom>
+        </p:spPr>
+        <p:style>
+          <a:lnRef idx="2">
+            <a:schemeClr val="accent1">
+              <a:shade val="50000"/>
+            </a:schemeClr>
+          </a:lnRef>
+          <a:fillRef idx="1">
+            <a:schemeClr val="accent1"/>
+          </a:fillRef>
+          <a:effectRef idx="0">
+            <a:schemeClr val="accent1"/>
+          </a:effectRef>
+          <a:fontRef idx="minor">
+            <a:schemeClr val="lt1"/>
+          </a:fontRef>
+        </p:style>
+        <p:txBody>
+          <a:bodyPr rtlCol="0" anchor="ctr"/>
+          <a:lstStyle/>
+          <a:p>
+            <a:pPr algn="ctr"/>
+            <a:r>
+              <a:rPr lang="en-US" dirty="0"/>
+              <a:t>Pocket Beagle</a:t>
+            </a:r>
+          </a:p>
+        </p:txBody>
+      </p:sp>
       <p:grpSp>
         <p:nvGrpSpPr>
           <p:cNvPr id="87" name="Group 86">
@@ -25268,6 +25156,895 @@
           </p:style>
         </p:cxnSp>
       </p:grpSp>
+      <p:grpSp>
+        <p:nvGrpSpPr>
+          <p:cNvPr id="16" name="Group 15">
+            <a:extLst>
+              <a:ext uri="{FF2B5EF4-FFF2-40B4-BE49-F238E27FC236}">
+                <a16:creationId xmlns:a16="http://schemas.microsoft.com/office/drawing/2014/main" id="{E8FC2BFB-1950-AF34-6E2F-9B2C0883234A}"/>
+              </a:ext>
+            </a:extLst>
+          </p:cNvPr>
+          <p:cNvGrpSpPr/>
+          <p:nvPr/>
+        </p:nvGrpSpPr>
+        <p:grpSpPr>
+          <a:xfrm>
+            <a:off x="435103" y="1298123"/>
+            <a:ext cx="849913" cy="786781"/>
+            <a:chOff x="435103" y="1298123"/>
+            <a:chExt cx="849913" cy="786781"/>
+          </a:xfrm>
+        </p:grpSpPr>
+        <p:sp>
+          <p:nvSpPr>
+            <p:cNvPr id="14" name="Oval 13">
+              <a:extLst>
+                <a:ext uri="{FF2B5EF4-FFF2-40B4-BE49-F238E27FC236}">
+                  <a16:creationId xmlns:a16="http://schemas.microsoft.com/office/drawing/2014/main" id="{4D262E35-7F89-8372-25DE-7F17487D1903}"/>
+                </a:ext>
+              </a:extLst>
+            </p:cNvPr>
+            <p:cNvSpPr/>
+            <p:nvPr/>
+          </p:nvSpPr>
+          <p:spPr>
+            <a:xfrm>
+              <a:off x="565649" y="1298123"/>
+              <a:ext cx="310652" cy="309355"/>
+            </a:xfrm>
+            <a:prstGeom prst="ellipse">
+              <a:avLst/>
+            </a:prstGeom>
+          </p:spPr>
+          <p:style>
+            <a:lnRef idx="2">
+              <a:schemeClr val="accent1">
+                <a:shade val="50000"/>
+              </a:schemeClr>
+            </a:lnRef>
+            <a:fillRef idx="1">
+              <a:schemeClr val="accent1"/>
+            </a:fillRef>
+            <a:effectRef idx="0">
+              <a:schemeClr val="accent1"/>
+            </a:effectRef>
+            <a:fontRef idx="minor">
+              <a:schemeClr val="lt1"/>
+            </a:fontRef>
+          </p:style>
+          <p:txBody>
+            <a:bodyPr rtlCol="0" anchor="ctr"/>
+            <a:lstStyle/>
+            <a:p>
+              <a:pPr algn="ctr"/>
+              <a:endParaRPr lang="en-US" sz="300" dirty="0"/>
+            </a:p>
+          </p:txBody>
+        </p:sp>
+        <p:sp>
+          <p:nvSpPr>
+            <p:cNvPr id="15" name="TextBox 14">
+              <a:extLst>
+                <a:ext uri="{FF2B5EF4-FFF2-40B4-BE49-F238E27FC236}">
+                  <a16:creationId xmlns:a16="http://schemas.microsoft.com/office/drawing/2014/main" id="{0B4D0880-200B-F418-8544-46B54BFB6616}"/>
+                </a:ext>
+              </a:extLst>
+            </p:cNvPr>
+            <p:cNvSpPr txBox="1"/>
+            <p:nvPr/>
+          </p:nvSpPr>
+          <p:spPr>
+            <a:xfrm>
+              <a:off x="435103" y="1592461"/>
+              <a:ext cx="849913" cy="492443"/>
+            </a:xfrm>
+            <a:prstGeom prst="rect">
+              <a:avLst/>
+            </a:prstGeom>
+            <a:noFill/>
+          </p:spPr>
+          <p:txBody>
+            <a:bodyPr wrap="none" rtlCol="0">
+              <a:spAutoFit/>
+            </a:bodyPr>
+            <a:lstStyle/>
+            <a:p>
+              <a:r>
+                <a:rPr lang="en-US" sz="800" dirty="0"/>
+                <a:t>Mounting Hole</a:t>
+              </a:r>
+            </a:p>
+            <a:p>
+              <a:endParaRPr lang="en-US" dirty="0"/>
+            </a:p>
+          </p:txBody>
+        </p:sp>
+      </p:grpSp>
+      <p:grpSp>
+        <p:nvGrpSpPr>
+          <p:cNvPr id="17" name="Group 16">
+            <a:extLst>
+              <a:ext uri="{FF2B5EF4-FFF2-40B4-BE49-F238E27FC236}">
+                <a16:creationId xmlns:a16="http://schemas.microsoft.com/office/drawing/2014/main" id="{861A830D-4259-70B4-9805-6C67EB74A58C}"/>
+              </a:ext>
+            </a:extLst>
+          </p:cNvPr>
+          <p:cNvGrpSpPr/>
+          <p:nvPr/>
+        </p:nvGrpSpPr>
+        <p:grpSpPr>
+          <a:xfrm>
+            <a:off x="4888409" y="1253890"/>
+            <a:ext cx="849913" cy="811097"/>
+            <a:chOff x="146810" y="1298123"/>
+            <a:chExt cx="849913" cy="811097"/>
+          </a:xfrm>
+        </p:grpSpPr>
+        <p:sp>
+          <p:nvSpPr>
+            <p:cNvPr id="19" name="Oval 18">
+              <a:extLst>
+                <a:ext uri="{FF2B5EF4-FFF2-40B4-BE49-F238E27FC236}">
+                  <a16:creationId xmlns:a16="http://schemas.microsoft.com/office/drawing/2014/main" id="{9B5C83D9-C8F3-12F5-1BC6-9BC141FA9988}"/>
+                </a:ext>
+              </a:extLst>
+            </p:cNvPr>
+            <p:cNvSpPr/>
+            <p:nvPr/>
+          </p:nvSpPr>
+          <p:spPr>
+            <a:xfrm>
+              <a:off x="565649" y="1298123"/>
+              <a:ext cx="310652" cy="309355"/>
+            </a:xfrm>
+            <a:prstGeom prst="ellipse">
+              <a:avLst/>
+            </a:prstGeom>
+          </p:spPr>
+          <p:style>
+            <a:lnRef idx="2">
+              <a:schemeClr val="accent1">
+                <a:shade val="50000"/>
+              </a:schemeClr>
+            </a:lnRef>
+            <a:fillRef idx="1">
+              <a:schemeClr val="accent1"/>
+            </a:fillRef>
+            <a:effectRef idx="0">
+              <a:schemeClr val="accent1"/>
+            </a:effectRef>
+            <a:fontRef idx="minor">
+              <a:schemeClr val="lt1"/>
+            </a:fontRef>
+          </p:style>
+          <p:txBody>
+            <a:bodyPr rtlCol="0" anchor="ctr"/>
+            <a:lstStyle/>
+            <a:p>
+              <a:pPr algn="ctr"/>
+              <a:endParaRPr lang="en-US" sz="300" dirty="0"/>
+            </a:p>
+          </p:txBody>
+        </p:sp>
+        <p:sp>
+          <p:nvSpPr>
+            <p:cNvPr id="20" name="TextBox 19">
+              <a:extLst>
+                <a:ext uri="{FF2B5EF4-FFF2-40B4-BE49-F238E27FC236}">
+                  <a16:creationId xmlns:a16="http://schemas.microsoft.com/office/drawing/2014/main" id="{360B01E3-49F4-EAA2-3110-C43168EEFFF5}"/>
+                </a:ext>
+              </a:extLst>
+            </p:cNvPr>
+            <p:cNvSpPr txBox="1"/>
+            <p:nvPr/>
+          </p:nvSpPr>
+          <p:spPr>
+            <a:xfrm>
+              <a:off x="146810" y="1616777"/>
+              <a:ext cx="849913" cy="492443"/>
+            </a:xfrm>
+            <a:prstGeom prst="rect">
+              <a:avLst/>
+            </a:prstGeom>
+            <a:noFill/>
+          </p:spPr>
+          <p:txBody>
+            <a:bodyPr wrap="none" rtlCol="0">
+              <a:spAutoFit/>
+            </a:bodyPr>
+            <a:lstStyle/>
+            <a:p>
+              <a:r>
+                <a:rPr lang="en-US" sz="800" dirty="0"/>
+                <a:t>Mounting Hole</a:t>
+              </a:r>
+            </a:p>
+            <a:p>
+              <a:endParaRPr lang="en-US" dirty="0"/>
+            </a:p>
+          </p:txBody>
+        </p:sp>
+      </p:grpSp>
+      <p:grpSp>
+        <p:nvGrpSpPr>
+          <p:cNvPr id="22" name="Group 21">
+            <a:extLst>
+              <a:ext uri="{FF2B5EF4-FFF2-40B4-BE49-F238E27FC236}">
+                <a16:creationId xmlns:a16="http://schemas.microsoft.com/office/drawing/2014/main" id="{81928EB0-FFDC-D8AF-A247-1A858DA01150}"/>
+              </a:ext>
+            </a:extLst>
+          </p:cNvPr>
+          <p:cNvGrpSpPr/>
+          <p:nvPr/>
+        </p:nvGrpSpPr>
+        <p:grpSpPr>
+          <a:xfrm>
+            <a:off x="533574" y="4930434"/>
+            <a:ext cx="1160565" cy="617573"/>
+            <a:chOff x="565649" y="1298123"/>
+            <a:chExt cx="1160565" cy="617573"/>
+          </a:xfrm>
+        </p:grpSpPr>
+        <p:sp>
+          <p:nvSpPr>
+            <p:cNvPr id="23" name="Oval 22">
+              <a:extLst>
+                <a:ext uri="{FF2B5EF4-FFF2-40B4-BE49-F238E27FC236}">
+                  <a16:creationId xmlns:a16="http://schemas.microsoft.com/office/drawing/2014/main" id="{055A1C95-6A0E-09C3-DC41-A9F963B62E11}"/>
+                </a:ext>
+              </a:extLst>
+            </p:cNvPr>
+            <p:cNvSpPr/>
+            <p:nvPr/>
+          </p:nvSpPr>
+          <p:spPr>
+            <a:xfrm>
+              <a:off x="565649" y="1298123"/>
+              <a:ext cx="310652" cy="309355"/>
+            </a:xfrm>
+            <a:prstGeom prst="ellipse">
+              <a:avLst/>
+            </a:prstGeom>
+          </p:spPr>
+          <p:style>
+            <a:lnRef idx="2">
+              <a:schemeClr val="accent1">
+                <a:shade val="50000"/>
+              </a:schemeClr>
+            </a:lnRef>
+            <a:fillRef idx="1">
+              <a:schemeClr val="accent1"/>
+            </a:fillRef>
+            <a:effectRef idx="0">
+              <a:schemeClr val="accent1"/>
+            </a:effectRef>
+            <a:fontRef idx="minor">
+              <a:schemeClr val="lt1"/>
+            </a:fontRef>
+          </p:style>
+          <p:txBody>
+            <a:bodyPr rtlCol="0" anchor="ctr"/>
+            <a:lstStyle/>
+            <a:p>
+              <a:pPr algn="ctr"/>
+              <a:endParaRPr lang="en-US" sz="300" dirty="0"/>
+            </a:p>
+          </p:txBody>
+        </p:sp>
+        <p:sp>
+          <p:nvSpPr>
+            <p:cNvPr id="30" name="TextBox 29">
+              <a:extLst>
+                <a:ext uri="{FF2B5EF4-FFF2-40B4-BE49-F238E27FC236}">
+                  <a16:creationId xmlns:a16="http://schemas.microsoft.com/office/drawing/2014/main" id="{91D06043-E665-1716-18D7-7E548CECBF1B}"/>
+                </a:ext>
+              </a:extLst>
+            </p:cNvPr>
+            <p:cNvSpPr txBox="1"/>
+            <p:nvPr/>
+          </p:nvSpPr>
+          <p:spPr>
+            <a:xfrm>
+              <a:off x="876301" y="1423253"/>
+              <a:ext cx="849913" cy="492443"/>
+            </a:xfrm>
+            <a:prstGeom prst="rect">
+              <a:avLst/>
+            </a:prstGeom>
+            <a:noFill/>
+          </p:spPr>
+          <p:txBody>
+            <a:bodyPr wrap="none" rtlCol="0">
+              <a:spAutoFit/>
+            </a:bodyPr>
+            <a:lstStyle/>
+            <a:p>
+              <a:r>
+                <a:rPr lang="en-US" sz="800" dirty="0"/>
+                <a:t>Mounting Hole</a:t>
+              </a:r>
+            </a:p>
+            <a:p>
+              <a:endParaRPr lang="en-US" dirty="0"/>
+            </a:p>
+          </p:txBody>
+        </p:sp>
+      </p:grpSp>
+      <p:grpSp>
+        <p:nvGrpSpPr>
+          <p:cNvPr id="31" name="Group 30">
+            <a:extLst>
+              <a:ext uri="{FF2B5EF4-FFF2-40B4-BE49-F238E27FC236}">
+                <a16:creationId xmlns:a16="http://schemas.microsoft.com/office/drawing/2014/main" id="{A6AA5BC8-A030-C511-894C-87BC0782DE4F}"/>
+              </a:ext>
+            </a:extLst>
+          </p:cNvPr>
+          <p:cNvGrpSpPr/>
+          <p:nvPr/>
+        </p:nvGrpSpPr>
+        <p:grpSpPr>
+          <a:xfrm>
+            <a:off x="4498211" y="4930434"/>
+            <a:ext cx="1123816" cy="668872"/>
+            <a:chOff x="-247515" y="1298123"/>
+            <a:chExt cx="1123816" cy="668872"/>
+          </a:xfrm>
+        </p:grpSpPr>
+        <p:sp>
+          <p:nvSpPr>
+            <p:cNvPr id="32" name="Oval 31">
+              <a:extLst>
+                <a:ext uri="{FF2B5EF4-FFF2-40B4-BE49-F238E27FC236}">
+                  <a16:creationId xmlns:a16="http://schemas.microsoft.com/office/drawing/2014/main" id="{1729F06A-D676-DEA4-39CD-124D8597A809}"/>
+                </a:ext>
+              </a:extLst>
+            </p:cNvPr>
+            <p:cNvSpPr/>
+            <p:nvPr/>
+          </p:nvSpPr>
+          <p:spPr>
+            <a:xfrm>
+              <a:off x="565649" y="1298123"/>
+              <a:ext cx="310652" cy="309355"/>
+            </a:xfrm>
+            <a:prstGeom prst="ellipse">
+              <a:avLst/>
+            </a:prstGeom>
+          </p:spPr>
+          <p:style>
+            <a:lnRef idx="2">
+              <a:schemeClr val="accent1">
+                <a:shade val="50000"/>
+              </a:schemeClr>
+            </a:lnRef>
+            <a:fillRef idx="1">
+              <a:schemeClr val="accent1"/>
+            </a:fillRef>
+            <a:effectRef idx="0">
+              <a:schemeClr val="accent1"/>
+            </a:effectRef>
+            <a:fontRef idx="minor">
+              <a:schemeClr val="lt1"/>
+            </a:fontRef>
+          </p:style>
+          <p:txBody>
+            <a:bodyPr rtlCol="0" anchor="ctr"/>
+            <a:lstStyle/>
+            <a:p>
+              <a:pPr algn="ctr"/>
+              <a:endParaRPr lang="en-US" sz="300" dirty="0"/>
+            </a:p>
+          </p:txBody>
+        </p:sp>
+        <p:sp>
+          <p:nvSpPr>
+            <p:cNvPr id="33" name="TextBox 32">
+              <a:extLst>
+                <a:ext uri="{FF2B5EF4-FFF2-40B4-BE49-F238E27FC236}">
+                  <a16:creationId xmlns:a16="http://schemas.microsoft.com/office/drawing/2014/main" id="{455C48F5-BCAF-F1B3-F1F1-D3210BDD9756}"/>
+                </a:ext>
+              </a:extLst>
+            </p:cNvPr>
+            <p:cNvSpPr txBox="1"/>
+            <p:nvPr/>
+          </p:nvSpPr>
+          <p:spPr>
+            <a:xfrm>
+              <a:off x="-247515" y="1474552"/>
+              <a:ext cx="849913" cy="492443"/>
+            </a:xfrm>
+            <a:prstGeom prst="rect">
+              <a:avLst/>
+            </a:prstGeom>
+            <a:noFill/>
+          </p:spPr>
+          <p:txBody>
+            <a:bodyPr wrap="none" rtlCol="0">
+              <a:spAutoFit/>
+            </a:bodyPr>
+            <a:lstStyle/>
+            <a:p>
+              <a:r>
+                <a:rPr lang="en-US" sz="800" dirty="0"/>
+                <a:t>Mounting Hole</a:t>
+              </a:r>
+            </a:p>
+            <a:p>
+              <a:endParaRPr lang="en-US" dirty="0"/>
+            </a:p>
+          </p:txBody>
+        </p:sp>
+      </p:grpSp>
+      <p:grpSp>
+        <p:nvGrpSpPr>
+          <p:cNvPr id="34" name="Group 33">
+            <a:extLst>
+              <a:ext uri="{FF2B5EF4-FFF2-40B4-BE49-F238E27FC236}">
+                <a16:creationId xmlns:a16="http://schemas.microsoft.com/office/drawing/2014/main" id="{B22538A9-3E81-1045-B72D-E74A5DD39106}"/>
+              </a:ext>
+            </a:extLst>
+          </p:cNvPr>
+          <p:cNvGrpSpPr/>
+          <p:nvPr/>
+        </p:nvGrpSpPr>
+        <p:grpSpPr>
+          <a:xfrm>
+            <a:off x="10818231" y="1236882"/>
+            <a:ext cx="849913" cy="811097"/>
+            <a:chOff x="146810" y="1298123"/>
+            <a:chExt cx="849913" cy="811097"/>
+          </a:xfrm>
+        </p:grpSpPr>
+        <p:sp>
+          <p:nvSpPr>
+            <p:cNvPr id="35" name="Oval 34">
+              <a:extLst>
+                <a:ext uri="{FF2B5EF4-FFF2-40B4-BE49-F238E27FC236}">
+                  <a16:creationId xmlns:a16="http://schemas.microsoft.com/office/drawing/2014/main" id="{1AB0B3DD-5ED2-1838-652E-085134D3D0CB}"/>
+                </a:ext>
+              </a:extLst>
+            </p:cNvPr>
+            <p:cNvSpPr/>
+            <p:nvPr/>
+          </p:nvSpPr>
+          <p:spPr>
+            <a:xfrm>
+              <a:off x="565649" y="1298123"/>
+              <a:ext cx="310652" cy="309355"/>
+            </a:xfrm>
+            <a:prstGeom prst="ellipse">
+              <a:avLst/>
+            </a:prstGeom>
+          </p:spPr>
+          <p:style>
+            <a:lnRef idx="2">
+              <a:schemeClr val="accent1">
+                <a:shade val="50000"/>
+              </a:schemeClr>
+            </a:lnRef>
+            <a:fillRef idx="1">
+              <a:schemeClr val="accent1"/>
+            </a:fillRef>
+            <a:effectRef idx="0">
+              <a:schemeClr val="accent1"/>
+            </a:effectRef>
+            <a:fontRef idx="minor">
+              <a:schemeClr val="lt1"/>
+            </a:fontRef>
+          </p:style>
+          <p:txBody>
+            <a:bodyPr rtlCol="0" anchor="ctr"/>
+            <a:lstStyle/>
+            <a:p>
+              <a:pPr algn="ctr"/>
+              <a:endParaRPr lang="en-US" sz="300" dirty="0"/>
+            </a:p>
+          </p:txBody>
+        </p:sp>
+        <p:sp>
+          <p:nvSpPr>
+            <p:cNvPr id="37" name="TextBox 36">
+              <a:extLst>
+                <a:ext uri="{FF2B5EF4-FFF2-40B4-BE49-F238E27FC236}">
+                  <a16:creationId xmlns:a16="http://schemas.microsoft.com/office/drawing/2014/main" id="{5BC5E3E5-3A32-1F01-8A12-B865CD8AD3E4}"/>
+                </a:ext>
+              </a:extLst>
+            </p:cNvPr>
+            <p:cNvSpPr txBox="1"/>
+            <p:nvPr/>
+          </p:nvSpPr>
+          <p:spPr>
+            <a:xfrm>
+              <a:off x="146810" y="1616777"/>
+              <a:ext cx="849913" cy="492443"/>
+            </a:xfrm>
+            <a:prstGeom prst="rect">
+              <a:avLst/>
+            </a:prstGeom>
+            <a:noFill/>
+          </p:spPr>
+          <p:txBody>
+            <a:bodyPr wrap="none" rtlCol="0">
+              <a:spAutoFit/>
+            </a:bodyPr>
+            <a:lstStyle/>
+            <a:p>
+              <a:r>
+                <a:rPr lang="en-US" sz="800" dirty="0"/>
+                <a:t>Mounting Hole</a:t>
+              </a:r>
+            </a:p>
+            <a:p>
+              <a:endParaRPr lang="en-US" dirty="0"/>
+            </a:p>
+          </p:txBody>
+        </p:sp>
+      </p:grpSp>
+      <p:grpSp>
+        <p:nvGrpSpPr>
+          <p:cNvPr id="38" name="Group 37">
+            <a:extLst>
+              <a:ext uri="{FF2B5EF4-FFF2-40B4-BE49-F238E27FC236}">
+                <a16:creationId xmlns:a16="http://schemas.microsoft.com/office/drawing/2014/main" id="{F3AE3F46-7EDC-D760-4C31-FC8DD7BEE8DA}"/>
+              </a:ext>
+            </a:extLst>
+          </p:cNvPr>
+          <p:cNvGrpSpPr/>
+          <p:nvPr/>
+        </p:nvGrpSpPr>
+        <p:grpSpPr>
+          <a:xfrm>
+            <a:off x="10424054" y="4887971"/>
+            <a:ext cx="1179472" cy="643988"/>
+            <a:chOff x="-303171" y="1298123"/>
+            <a:chExt cx="1179472" cy="643988"/>
+          </a:xfrm>
+        </p:grpSpPr>
+        <p:sp>
+          <p:nvSpPr>
+            <p:cNvPr id="39" name="Oval 38">
+              <a:extLst>
+                <a:ext uri="{FF2B5EF4-FFF2-40B4-BE49-F238E27FC236}">
+                  <a16:creationId xmlns:a16="http://schemas.microsoft.com/office/drawing/2014/main" id="{D25FAF6D-4480-3F78-BA53-2BE12D06C27D}"/>
+                </a:ext>
+              </a:extLst>
+            </p:cNvPr>
+            <p:cNvSpPr/>
+            <p:nvPr/>
+          </p:nvSpPr>
+          <p:spPr>
+            <a:xfrm>
+              <a:off x="565649" y="1298123"/>
+              <a:ext cx="310652" cy="309355"/>
+            </a:xfrm>
+            <a:prstGeom prst="ellipse">
+              <a:avLst/>
+            </a:prstGeom>
+          </p:spPr>
+          <p:style>
+            <a:lnRef idx="2">
+              <a:schemeClr val="accent1">
+                <a:shade val="50000"/>
+              </a:schemeClr>
+            </a:lnRef>
+            <a:fillRef idx="1">
+              <a:schemeClr val="accent1"/>
+            </a:fillRef>
+            <a:effectRef idx="0">
+              <a:schemeClr val="accent1"/>
+            </a:effectRef>
+            <a:fontRef idx="minor">
+              <a:schemeClr val="lt1"/>
+            </a:fontRef>
+          </p:style>
+          <p:txBody>
+            <a:bodyPr rtlCol="0" anchor="ctr"/>
+            <a:lstStyle/>
+            <a:p>
+              <a:pPr algn="ctr"/>
+              <a:endParaRPr lang="en-US" sz="300" dirty="0"/>
+            </a:p>
+          </p:txBody>
+        </p:sp>
+        <p:sp>
+          <p:nvSpPr>
+            <p:cNvPr id="43" name="TextBox 42">
+              <a:extLst>
+                <a:ext uri="{FF2B5EF4-FFF2-40B4-BE49-F238E27FC236}">
+                  <a16:creationId xmlns:a16="http://schemas.microsoft.com/office/drawing/2014/main" id="{A31D1CE0-DF7D-9E95-709E-C8BA32093EAB}"/>
+                </a:ext>
+              </a:extLst>
+            </p:cNvPr>
+            <p:cNvSpPr txBox="1"/>
+            <p:nvPr/>
+          </p:nvSpPr>
+          <p:spPr>
+            <a:xfrm>
+              <a:off x="-303171" y="1449668"/>
+              <a:ext cx="849913" cy="492443"/>
+            </a:xfrm>
+            <a:prstGeom prst="rect">
+              <a:avLst/>
+            </a:prstGeom>
+            <a:noFill/>
+          </p:spPr>
+          <p:txBody>
+            <a:bodyPr wrap="none" rtlCol="0">
+              <a:spAutoFit/>
+            </a:bodyPr>
+            <a:lstStyle/>
+            <a:p>
+              <a:r>
+                <a:rPr lang="en-US" sz="800" dirty="0"/>
+                <a:t>Mounting Hole</a:t>
+              </a:r>
+            </a:p>
+            <a:p>
+              <a:endParaRPr lang="en-US" dirty="0"/>
+            </a:p>
+          </p:txBody>
+        </p:sp>
+      </p:grpSp>
+      <p:grpSp>
+        <p:nvGrpSpPr>
+          <p:cNvPr id="45" name="Group 44">
+            <a:extLst>
+              <a:ext uri="{FF2B5EF4-FFF2-40B4-BE49-F238E27FC236}">
+                <a16:creationId xmlns:a16="http://schemas.microsoft.com/office/drawing/2014/main" id="{AB889C41-22E4-52F2-A1D1-8FC7C14B8165}"/>
+              </a:ext>
+            </a:extLst>
+          </p:cNvPr>
+          <p:cNvGrpSpPr/>
+          <p:nvPr/>
+        </p:nvGrpSpPr>
+        <p:grpSpPr>
+          <a:xfrm>
+            <a:off x="6403135" y="1227255"/>
+            <a:ext cx="849913" cy="783087"/>
+            <a:chOff x="474924" y="1298123"/>
+            <a:chExt cx="849913" cy="783087"/>
+          </a:xfrm>
+        </p:grpSpPr>
+        <p:sp>
+          <p:nvSpPr>
+            <p:cNvPr id="46" name="Oval 45">
+              <a:extLst>
+                <a:ext uri="{FF2B5EF4-FFF2-40B4-BE49-F238E27FC236}">
+                  <a16:creationId xmlns:a16="http://schemas.microsoft.com/office/drawing/2014/main" id="{7AA38144-9B6C-2E9B-6EDE-706965880317}"/>
+                </a:ext>
+              </a:extLst>
+            </p:cNvPr>
+            <p:cNvSpPr/>
+            <p:nvPr/>
+          </p:nvSpPr>
+          <p:spPr>
+            <a:xfrm>
+              <a:off x="565649" y="1298123"/>
+              <a:ext cx="310652" cy="309355"/>
+            </a:xfrm>
+            <a:prstGeom prst="ellipse">
+              <a:avLst/>
+            </a:prstGeom>
+          </p:spPr>
+          <p:style>
+            <a:lnRef idx="2">
+              <a:schemeClr val="accent1">
+                <a:shade val="50000"/>
+              </a:schemeClr>
+            </a:lnRef>
+            <a:fillRef idx="1">
+              <a:schemeClr val="accent1"/>
+            </a:fillRef>
+            <a:effectRef idx="0">
+              <a:schemeClr val="accent1"/>
+            </a:effectRef>
+            <a:fontRef idx="minor">
+              <a:schemeClr val="lt1"/>
+            </a:fontRef>
+          </p:style>
+          <p:txBody>
+            <a:bodyPr rtlCol="0" anchor="ctr"/>
+            <a:lstStyle/>
+            <a:p>
+              <a:pPr algn="ctr"/>
+              <a:endParaRPr lang="en-US" sz="300" dirty="0"/>
+            </a:p>
+          </p:txBody>
+        </p:sp>
+        <p:sp>
+          <p:nvSpPr>
+            <p:cNvPr id="59" name="TextBox 58">
+              <a:extLst>
+                <a:ext uri="{FF2B5EF4-FFF2-40B4-BE49-F238E27FC236}">
+                  <a16:creationId xmlns:a16="http://schemas.microsoft.com/office/drawing/2014/main" id="{FC7C3527-B807-3631-E026-D20C7D5F6226}"/>
+                </a:ext>
+              </a:extLst>
+            </p:cNvPr>
+            <p:cNvSpPr txBox="1"/>
+            <p:nvPr/>
+          </p:nvSpPr>
+          <p:spPr>
+            <a:xfrm>
+              <a:off x="474924" y="1588767"/>
+              <a:ext cx="849913" cy="492443"/>
+            </a:xfrm>
+            <a:prstGeom prst="rect">
+              <a:avLst/>
+            </a:prstGeom>
+            <a:noFill/>
+          </p:spPr>
+          <p:txBody>
+            <a:bodyPr wrap="none" rtlCol="0">
+              <a:spAutoFit/>
+            </a:bodyPr>
+            <a:lstStyle/>
+            <a:p>
+              <a:r>
+                <a:rPr lang="en-US" sz="800" dirty="0"/>
+                <a:t>Mounting Hole</a:t>
+              </a:r>
+            </a:p>
+            <a:p>
+              <a:endParaRPr lang="en-US" dirty="0"/>
+            </a:p>
+          </p:txBody>
+        </p:sp>
+      </p:grpSp>
+      <p:grpSp>
+        <p:nvGrpSpPr>
+          <p:cNvPr id="60" name="Group 59">
+            <a:extLst>
+              <a:ext uri="{FF2B5EF4-FFF2-40B4-BE49-F238E27FC236}">
+                <a16:creationId xmlns:a16="http://schemas.microsoft.com/office/drawing/2014/main" id="{5A68D6CC-8F23-C786-15EF-831DFE4F247C}"/>
+              </a:ext>
+            </a:extLst>
+          </p:cNvPr>
+          <p:cNvGrpSpPr/>
+          <p:nvPr/>
+        </p:nvGrpSpPr>
+        <p:grpSpPr>
+          <a:xfrm>
+            <a:off x="6518466" y="4887971"/>
+            <a:ext cx="1161131" cy="668113"/>
+            <a:chOff x="565649" y="1298123"/>
+            <a:chExt cx="1161131" cy="668113"/>
+          </a:xfrm>
+        </p:grpSpPr>
+        <p:sp>
+          <p:nvSpPr>
+            <p:cNvPr id="69" name="Oval 68">
+              <a:extLst>
+                <a:ext uri="{FF2B5EF4-FFF2-40B4-BE49-F238E27FC236}">
+                  <a16:creationId xmlns:a16="http://schemas.microsoft.com/office/drawing/2014/main" id="{1C47EBE2-7A26-DCD5-542F-6C8864D6C5A9}"/>
+                </a:ext>
+              </a:extLst>
+            </p:cNvPr>
+            <p:cNvSpPr/>
+            <p:nvPr/>
+          </p:nvSpPr>
+          <p:spPr>
+            <a:xfrm>
+              <a:off x="565649" y="1298123"/>
+              <a:ext cx="310652" cy="309355"/>
+            </a:xfrm>
+            <a:prstGeom prst="ellipse">
+              <a:avLst/>
+            </a:prstGeom>
+          </p:spPr>
+          <p:style>
+            <a:lnRef idx="2">
+              <a:schemeClr val="accent1">
+                <a:shade val="50000"/>
+              </a:schemeClr>
+            </a:lnRef>
+            <a:fillRef idx="1">
+              <a:schemeClr val="accent1"/>
+            </a:fillRef>
+            <a:effectRef idx="0">
+              <a:schemeClr val="accent1"/>
+            </a:effectRef>
+            <a:fontRef idx="minor">
+              <a:schemeClr val="lt1"/>
+            </a:fontRef>
+          </p:style>
+          <p:txBody>
+            <a:bodyPr rtlCol="0" anchor="ctr"/>
+            <a:lstStyle/>
+            <a:p>
+              <a:pPr algn="ctr"/>
+              <a:endParaRPr lang="en-US" sz="300" dirty="0"/>
+            </a:p>
+          </p:txBody>
+        </p:sp>
+        <p:sp>
+          <p:nvSpPr>
+            <p:cNvPr id="70" name="TextBox 69">
+              <a:extLst>
+                <a:ext uri="{FF2B5EF4-FFF2-40B4-BE49-F238E27FC236}">
+                  <a16:creationId xmlns:a16="http://schemas.microsoft.com/office/drawing/2014/main" id="{B14EB552-07BC-B147-729F-9E1CFEF28796}"/>
+                </a:ext>
+              </a:extLst>
+            </p:cNvPr>
+            <p:cNvSpPr txBox="1"/>
+            <p:nvPr/>
+          </p:nvSpPr>
+          <p:spPr>
+            <a:xfrm>
+              <a:off x="876867" y="1473793"/>
+              <a:ext cx="849913" cy="492443"/>
+            </a:xfrm>
+            <a:prstGeom prst="rect">
+              <a:avLst/>
+            </a:prstGeom>
+            <a:noFill/>
+          </p:spPr>
+          <p:txBody>
+            <a:bodyPr wrap="none" rtlCol="0">
+              <a:spAutoFit/>
+            </a:bodyPr>
+            <a:lstStyle/>
+            <a:p>
+              <a:r>
+                <a:rPr lang="en-US" sz="800" dirty="0"/>
+                <a:t>Mounting Hole</a:t>
+              </a:r>
+            </a:p>
+            <a:p>
+              <a:endParaRPr lang="en-US" dirty="0"/>
+            </a:p>
+          </p:txBody>
+        </p:sp>
+      </p:grpSp>
+      <p:sp>
+        <p:nvSpPr>
+          <p:cNvPr id="72" name="Rectangle 71">
+            <a:extLst>
+              <a:ext uri="{FF2B5EF4-FFF2-40B4-BE49-F238E27FC236}">
+                <a16:creationId xmlns:a16="http://schemas.microsoft.com/office/drawing/2014/main" id="{4A816216-0EAB-B71F-3E18-5122FD395FAC}"/>
+              </a:ext>
+            </a:extLst>
+          </p:cNvPr>
+          <p:cNvSpPr/>
+          <p:nvPr/>
+        </p:nvSpPr>
+        <p:spPr>
+          <a:xfrm>
+            <a:off x="10670911" y="2727231"/>
+            <a:ext cx="884599" cy="957907"/>
+          </a:xfrm>
+          <a:prstGeom prst="rect">
+            <a:avLst/>
+          </a:prstGeom>
+        </p:spPr>
+        <p:style>
+          <a:lnRef idx="2">
+            <a:schemeClr val="accent1">
+              <a:shade val="50000"/>
+            </a:schemeClr>
+          </a:lnRef>
+          <a:fillRef idx="1">
+            <a:schemeClr val="accent1"/>
+          </a:fillRef>
+          <a:effectRef idx="0">
+            <a:schemeClr val="accent1"/>
+          </a:effectRef>
+          <a:fontRef idx="minor">
+            <a:schemeClr val="lt1"/>
+          </a:fontRef>
+        </p:style>
+        <p:txBody>
+          <a:bodyPr rtlCol="0" anchor="ctr"/>
+          <a:lstStyle/>
+          <a:p>
+            <a:pPr algn="ctr"/>
+            <a:r>
+              <a:rPr lang="en-US" sz="1200" dirty="0"/>
+              <a:t>USB Connector</a:t>
+            </a:r>
+          </a:p>
+        </p:txBody>
+      </p:sp>
     </p:spTree>
     <p:extLst>
       <p:ext uri="{BB962C8B-B14F-4D97-AF65-F5344CB8AC3E}">

</xml_diff>